<commit_message>
Update presentation and script with actual local-run numbers
- pipeline_results.json: replaced server numbers with user's actual output
  (ROC-AUC 0.8575, 40th recall 93.30%, F1 0.9650, training 118.08s)
- Regenerated all data figures with correct numbers + large fonts
- Removed cross-domain data fusion figure from Datasets slide
- Added detailed A2D2 stats and HIL fault file listing to Datasets slide
- Updated defense_script.txt with all corrected numbers
- Fixed computing costs to reflect actual timing (147s total, ~157x faster)

https://claude.ai/code/session_01DCwSioo9YwPtfdCBuDU7sq
</commit_message>
<xml_diff>
--- a/thesis_report/Defense_Presentation.pptx
+++ b/thesis_report/Defense_Presentation.pptx
@@ -7242,7 +7242,7 @@
                         </a:defRPr>
                       </a:pPr>
                       <a:r>
-                        <a:t>0.889</a:t>
+                        <a:t>0.893</a:t>
                       </a:r>
                     </a:p>
                   </a:txBody>
@@ -7282,7 +7282,7 @@
                         </a:defRPr>
                       </a:pPr>
                       <a:r>
-                        <a:t>0.646</a:t>
+                        <a:t>0.707</a:t>
                       </a:r>
                     </a:p>
                   </a:txBody>
@@ -7302,7 +7302,7 @@
                         </a:defRPr>
                       </a:pPr>
                       <a:r>
-                        <a:t>0.780</a:t>
+                        <a:t>0.825</a:t>
                       </a:r>
                     </a:p>
                   </a:txBody>
@@ -7348,7 +7348,7 @@
                         </a:defRPr>
                       </a:pPr>
                       <a:r>
-                        <a:t>0.920</a:t>
+                        <a:t>0.927</a:t>
                       </a:r>
                     </a:p>
                   </a:txBody>
@@ -7396,7 +7396,7 @@
                         </a:defRPr>
                       </a:pPr>
                       <a:r>
-                        <a:t>0.826</a:t>
+                        <a:t>0.843</a:t>
                       </a:r>
                     </a:p>
                   </a:txBody>
@@ -7420,7 +7420,7 @@
                         </a:defRPr>
                       </a:pPr>
                       <a:r>
-                        <a:t>0.904</a:t>
+                        <a:t>0.914</a:t>
                       </a:r>
                     </a:p>
                   </a:txBody>
@@ -7466,7 +7466,7 @@
                         </a:defRPr>
                       </a:pPr>
                       <a:r>
-                        <a:t>0.945</a:t>
+                        <a:t>0.941</a:t>
                       </a:r>
                     </a:p>
                   </a:txBody>
@@ -7506,7 +7506,7 @@
                         </a:defRPr>
                       </a:pPr>
                       <a:r>
-                        <a:t>0.875</a:t>
+                        <a:t>0.862</a:t>
                       </a:r>
                     </a:p>
                   </a:txBody>
@@ -7526,7 +7526,7 @@
                         </a:defRPr>
                       </a:pPr>
                       <a:r>
-                        <a:t>0.933</a:t>
+                        <a:t>0.925</a:t>
                       </a:r>
                     </a:p>
                   </a:txBody>
@@ -7572,7 +7572,7 @@
                         </a:defRPr>
                       </a:pPr>
                       <a:r>
-                        <a:t>0.967</a:t>
+                        <a:t>0.968</a:t>
                       </a:r>
                     </a:p>
                   </a:txBody>
@@ -7620,7 +7620,7 @@
                         </a:defRPr>
                       </a:pPr>
                       <a:r>
-                        <a:t>0.913</a:t>
+                        <a:t>0.909</a:t>
                       </a:r>
                     </a:p>
                   </a:txBody>
@@ -7644,7 +7644,7 @@
                         </a:defRPr>
                       </a:pPr>
                       <a:r>
-                        <a:t>0.954</a:t>
+                        <a:t>0.952</a:t>
                       </a:r>
                     </a:p>
                   </a:txBody>
@@ -7690,7 +7690,7 @@
                         </a:defRPr>
                       </a:pPr>
                       <a:r>
-                        <a:t>0.969</a:t>
+                        <a:t>0.971</a:t>
                       </a:r>
                     </a:p>
                   </a:txBody>
@@ -7730,7 +7730,7 @@
                         </a:defRPr>
                       </a:pPr>
                       <a:r>
-                        <a:t>0.919</a:t>
+                        <a:t>0.917</a:t>
                       </a:r>
                     </a:p>
                   </a:txBody>
@@ -7750,7 +7750,7 @@
                         </a:defRPr>
                       </a:pPr>
                       <a:r>
-                        <a:t>0.957</a:t>
+                        <a:t>0.956</a:t>
                       </a:r>
                     </a:p>
                   </a:txBody>
@@ -7796,7 +7796,7 @@
                         </a:defRPr>
                       </a:pPr>
                       <a:r>
-                        <a:t>0.971</a:t>
+                        <a:t>0.974</a:t>
                       </a:r>
                     </a:p>
                   </a:txBody>
@@ -7844,7 +7844,7 @@
                         </a:defRPr>
                       </a:pPr>
                       <a:r>
-                        <a:t>0.929</a:t>
+                        <a:t>0.933</a:t>
                       </a:r>
                     </a:p>
                   </a:txBody>
@@ -7868,7 +7868,7 @@
                         </a:defRPr>
                       </a:pPr>
                       <a:r>
-                        <a:t>0.963</a:t>
+                        <a:t>0.965</a:t>
                       </a:r>
                     </a:p>
                   </a:txBody>
@@ -7952,7 +7952,7 @@
               </a:defRPr>
             </a:pPr>
             <a:r>
-              <a:t>Best F1 = 0.963 at 40th percentile</a:t>
+              <a:t>Best F1 = 0.965 at 40th percentile</a:t>
             </a:r>
           </a:p>
           <a:p>
@@ -7971,7 +7971,7 @@
               </a:defRPr>
             </a:pPr>
             <a:r>
-              <a:t>ROC-AUC = 0.852</a:t>
+              <a:t>ROC-AUC = 0.858</a:t>
             </a:r>
           </a:p>
         </p:txBody>
@@ -8245,7 +8245,7 @@
                         </a:defRPr>
                       </a:pPr>
                       <a:r>
-                        <a:t>285/314</a:t>
+                        <a:t>288/314</a:t>
                       </a:r>
                     </a:p>
                   </a:txBody>
@@ -8265,7 +8265,7 @@
                         </a:defRPr>
                       </a:pPr>
                       <a:r>
-                        <a:t>90.8%</a:t>
+                        <a:t>91.7%</a:t>
                       </a:r>
                     </a:p>
                   </a:txBody>
@@ -8285,7 +8285,7 @@
                         </a:defRPr>
                       </a:pPr>
                       <a:r>
-                        <a:t>0.952</a:t>
+                        <a:t>0.957</a:t>
                       </a:r>
                     </a:p>
                   </a:txBody>
@@ -8331,7 +8331,7 @@
                         </a:defRPr>
                       </a:pPr>
                       <a:r>
-                        <a:t>291/321</a:t>
+                        <a:t>294/321</a:t>
                       </a:r>
                     </a:p>
                   </a:txBody>
@@ -8355,7 +8355,7 @@
                         </a:defRPr>
                       </a:pPr>
                       <a:r>
-                        <a:t>90.7%</a:t>
+                        <a:t>91.6%</a:t>
                       </a:r>
                     </a:p>
                   </a:txBody>
@@ -8379,7 +8379,7 @@
                         </a:defRPr>
                       </a:pPr>
                       <a:r>
-                        <a:t>0.951</a:t>
+                        <a:t>0.956</a:t>
                       </a:r>
                     </a:p>
                   </a:txBody>
@@ -8425,7 +8425,7 @@
                         </a:defRPr>
                       </a:pPr>
                       <a:r>
-                        <a:t>279/315</a:t>
+                        <a:t>283/315</a:t>
                       </a:r>
                     </a:p>
                   </a:txBody>
@@ -8445,7 +8445,7 @@
                         </a:defRPr>
                       </a:pPr>
                       <a:r>
-                        <a:t>88.6%</a:t>
+                        <a:t>89.8%</a:t>
                       </a:r>
                     </a:p>
                   </a:txBody>
@@ -8465,7 +8465,7 @@
                         </a:defRPr>
                       </a:pPr>
                       <a:r>
-                        <a:t>0.939</a:t>
+                        <a:t>0.947</a:t>
                       </a:r>
                     </a:p>
                   </a:txBody>
@@ -8511,7 +8511,7 @@
                         </a:defRPr>
                       </a:pPr>
                       <a:r>
-                        <a:t>321/321</a:t>
+                        <a:t>320/321</a:t>
                       </a:r>
                     </a:p>
                   </a:txBody>
@@ -8535,7 +8535,7 @@
                         </a:defRPr>
                       </a:pPr>
                       <a:r>
-                        <a:t>100.0%</a:t>
+                        <a:t>99.7%</a:t>
                       </a:r>
                     </a:p>
                   </a:txBody>
@@ -8559,7 +8559,7 @@
                         </a:defRPr>
                       </a:pPr>
                       <a:r>
-                        <a:t>1.000</a:t>
+                        <a:t>0.998</a:t>
                       </a:r>
                     </a:p>
                   </a:txBody>
@@ -8605,7 +8605,7 @@
                         </a:defRPr>
                       </a:pPr>
                       <a:r>
-                        <a:t>301/315</a:t>
+                        <a:t>302/315</a:t>
                       </a:r>
                     </a:p>
                   </a:txBody>
@@ -8625,7 +8625,7 @@
                         </a:defRPr>
                       </a:pPr>
                       <a:r>
-                        <a:t>95.6%</a:t>
+                        <a:t>95.9%</a:t>
                       </a:r>
                     </a:p>
                   </a:txBody>
@@ -8645,7 +8645,7 @@
                         </a:defRPr>
                       </a:pPr>
                       <a:r>
-                        <a:t>0.977</a:t>
+                        <a:t>0.979</a:t>
                       </a:r>
                     </a:p>
                   </a:txBody>
@@ -8691,7 +8691,7 @@
                         </a:defRPr>
                       </a:pPr>
                       <a:r>
-                        <a:t>298/325</a:t>
+                        <a:t>296/325</a:t>
                       </a:r>
                     </a:p>
                   </a:txBody>
@@ -8715,7 +8715,7 @@
                         </a:defRPr>
                       </a:pPr>
                       <a:r>
-                        <a:t>91.7%</a:t>
+                        <a:t>91.1%</a:t>
                       </a:r>
                     </a:p>
                   </a:txBody>
@@ -8739,7 +8739,7 @@
                         </a:defRPr>
                       </a:pPr>
                       <a:r>
-                        <a:t>0.957</a:t>
+                        <a:t>0.953</a:t>
                       </a:r>
                     </a:p>
                   </a:txBody>
@@ -8804,7 +8804,7 @@
               </a:defRPr>
             </a:pPr>
             <a:r>
-              <a:t>Speed gain: 100.0% recall (best)</a:t>
+              <a:t>Speed gain: 99.7% recall (best)</a:t>
             </a:r>
           </a:p>
           <a:p>
@@ -8823,7 +8823,7 @@
               </a:defRPr>
             </a:pPr>
             <a:r>
-              <a:t>Acc stuck: 88.6% recall (hardest)</a:t>
+              <a:t>Acc stuck: 89.8% recall (hardest)</a:t>
             </a:r>
           </a:p>
           <a:p>
@@ -9044,7 +9044,7 @@
               </a:defRPr>
             </a:pPr>
             <a:r>
-              <a:t>Accuracy:    91.4%</a:t>
+              <a:t>Accuracy:    91.8%</a:t>
             </a:r>
           </a:p>
           <a:p>
@@ -9082,7 +9082,7 @@
               </a:defRPr>
             </a:pPr>
             <a:r>
-              <a:t>Recall:        92.9%</a:t>
+              <a:t>Recall:        93.3%</a:t>
             </a:r>
           </a:p>
           <a:p>
@@ -9101,7 +9101,7 @@
               </a:defRPr>
             </a:pPr>
             <a:r>
-              <a:t>F1-Score:    0.954</a:t>
+              <a:t>F1-Score:    0.956</a:t>
             </a:r>
           </a:p>
         </p:txBody>
@@ -9301,7 +9301,7 @@
                         </a:defRPr>
                       </a:pPr>
                       <a:r>
-                        <a:t>FN = 136</a:t>
+                        <a:t>FN = 128</a:t>
                       </a:r>
                     </a:p>
                   </a:txBody>
@@ -9325,7 +9325,7 @@
                         </a:defRPr>
                       </a:pPr>
                       <a:r>
-                        <a:t>TP = 1,775</a:t>
+                        <a:t>TP = 1,783</a:t>
                       </a:r>
                     </a:p>
                   </a:txBody>
@@ -9371,7 +9371,7 @@
               </a:defRPr>
             </a:pPr>
             <a:r>
-              <a:t>ROC-AUC = 0.852</a:t>
+              <a:t>ROC-AUC = 0.858</a:t>
             </a:r>
           </a:p>
           <a:p>
@@ -9851,7 +9851,7 @@
                         </a:defRPr>
                       </a:pPr>
                       <a:r>
-                        <a:t>10.80</a:t>
+                        <a:t>18.87</a:t>
                       </a:r>
                     </a:p>
                   </a:txBody>
@@ -9871,7 +9871,7 @@
                         </a:defRPr>
                       </a:pPr>
                       <a:r>
-                        <a:t>20.2%</a:t>
+                        <a:t>12.9%</a:t>
                       </a:r>
                     </a:p>
                   </a:txBody>
@@ -9941,7 +9941,7 @@
                         </a:defRPr>
                       </a:pPr>
                       <a:r>
-                        <a:t>26.56</a:t>
+                        <a:t>118.08</a:t>
                       </a:r>
                     </a:p>
                   </a:txBody>
@@ -9965,7 +9965,7 @@
                         </a:defRPr>
                       </a:pPr>
                       <a:r>
-                        <a:t>49.7%</a:t>
+                        <a:t>80.5%</a:t>
                       </a:r>
                     </a:p>
                   </a:txBody>
@@ -10031,7 +10031,7 @@
                         </a:defRPr>
                       </a:pPr>
                       <a:r>
-                        <a:t>10.45</a:t>
+                        <a:t>3.09</a:t>
                       </a:r>
                     </a:p>
                   </a:txBody>
@@ -10051,7 +10051,7 @@
                         </a:defRPr>
                       </a:pPr>
                       <a:r>
-                        <a:t>19.5%</a:t>
+                        <a:t>2.1%</a:t>
                       </a:r>
                     </a:p>
                   </a:txBody>
@@ -10121,7 +10121,7 @@
                         </a:defRPr>
                       </a:pPr>
                       <a:r>
-                        <a:t>1.01</a:t>
+                        <a:t>1.59</a:t>
                       </a:r>
                     </a:p>
                   </a:txBody>
@@ -10145,7 +10145,7 @@
                         </a:defRPr>
                       </a:pPr>
                       <a:r>
-                        <a:t>1.9%</a:t>
+                        <a:t>1.1%</a:t>
                       </a:r>
                     </a:p>
                   </a:txBody>
@@ -10211,7 +10211,7 @@
                         </a:defRPr>
                       </a:pPr>
                       <a:r>
-                        <a:t>4.67</a:t>
+                        <a:t>4.98</a:t>
                       </a:r>
                     </a:p>
                   </a:txBody>
@@ -10231,7 +10231,7 @@
                         </a:defRPr>
                       </a:pPr>
                       <a:r>
-                        <a:t>8.7%</a:t>
+                        <a:t>3.4%</a:t>
                       </a:r>
                     </a:p>
                   </a:txBody>
@@ -10301,7 +10301,7 @@
                         </a:defRPr>
                       </a:pPr>
                       <a:r>
-                        <a:t>53.49</a:t>
+                        <a:t>146.62</a:t>
                       </a:r>
                     </a:p>
                   </a:txBody>
@@ -10406,7 +10406,7 @@
               </a:defRPr>
             </a:pPr>
             <a:r>
-              <a:t>Training: 26.6 s (one-time cost)</a:t>
+              <a:t>Training: 118.1 s (one-time cost)</a:t>
             </a:r>
           </a:p>
           <a:p>
@@ -10476,7 +10476,7 @@
               </a:defRPr>
             </a:pPr>
             <a:r>
-              <a:t>Total pipeline: under 1 minute</a:t>
+              <a:t>Total pipeline: ~147 s (~2.4 min)</a:t>
             </a:r>
           </a:p>
           <a:p>
@@ -10584,7 +10584,7 @@
               </a:defRPr>
             </a:pPr>
             <a:r>
-              <a:t>  Our approach: ~860x faster</a:t>
+              <a:t>  Our approach: ~157x faster</a:t>
             </a:r>
           </a:p>
           <a:p>
@@ -10820,7 +10820,7 @@
               </a:defRPr>
             </a:pPr>
             <a:r>
-              <a:t>RQ2:  Per-fault precision = 1.0 at all thresholds. Recall: 64.6% → 92.9%.</a:t>
+              <a:t>RQ2:  Per-fault precision = 1.0 at all thresholds. Recall: 70.7% → 93.3%.</a:t>
             </a:r>
           </a:p>
           <a:p>
@@ -10839,7 +10839,7 @@
               </a:defRPr>
             </a:pPr>
             <a:r>
-              <a:t>Optimal: 40th percentile (F1 = 0.963). ✓</a:t>
+              <a:t>Optimal: 40th percentile (F1 = 0.965). ✓</a:t>
             </a:r>
           </a:p>
         </p:txBody>
@@ -10894,7 +10894,7 @@
               </a:defRPr>
             </a:pPr>
             <a:r>
-              <a:t>RQ3:  Speed gain = 100.0% recall (easiest). Acc stuck = 88.6% (hardest).</a:t>
+              <a:t>RQ3:  Speed gain = 99.7% recall (easiest). Acc stuck = 89.8% (hardest).</a:t>
             </a:r>
           </a:p>
           <a:p>
@@ -13309,7 +13309,7 @@
         <p:spPr>
           <a:xfrm>
             <a:off x="457200" y="1417320"/>
-            <a:ext cx="5303520" cy="2560320"/>
+            <a:ext cx="5303520" cy="5029200"/>
           </a:xfrm>
           <a:prstGeom prst="rect">
             <a:avLst/>
@@ -13323,7 +13323,7 @@
           <a:lstStyle/>
           <a:p>
             <a:pPr algn="l">
-              <a:defRPr sz="1700" b="1">
+              <a:defRPr sz="1800" b="1">
                 <a:solidFill>
                   <a:srgbClr val="00783C"/>
                 </a:solidFill>
@@ -13342,7 +13342,7 @@
               <a:spcAft>
                 <a:spcPts val="200"/>
               </a:spcAft>
-              <a:defRPr sz="1400" b="0">
+              <a:defRPr sz="1500" b="0">
                 <a:solidFill>
                   <a:srgbClr val="000000"/>
                 </a:solidFill>
@@ -13361,7 +13361,7 @@
               <a:spcAft>
                 <a:spcPts val="200"/>
               </a:spcAft>
-              <a:defRPr sz="1400" b="0">
+              <a:defRPr sz="1500" b="0">
                 <a:solidFill>
                   <a:srgbClr val="000000"/>
                 </a:solidFill>
@@ -13380,7 +13380,7 @@
               <a:spcAft>
                 <a:spcPts val="200"/>
               </a:spcAft>
-              <a:defRPr sz="1400" b="0">
+              <a:defRPr sz="1500" b="0">
                 <a:solidFill>
                   <a:srgbClr val="000000"/>
                 </a:solidFill>
@@ -13399,7 +13399,7 @@
               <a:spcAft>
                 <a:spcPts val="200"/>
               </a:spcAft>
-              <a:defRPr sz="1400" b="0">
+              <a:defRPr sz="1500" b="0">
                 <a:solidFill>
                   <a:srgbClr val="000000"/>
                 </a:solidFill>
@@ -13407,7 +13407,7 @@
               </a:defRPr>
             </a:pPr>
             <a:r>
-              <a:t>Speed upsampled 50 Hz → 100 Hz</a:t>
+              <a:t>Accelerator: 100 Hz native</a:t>
             </a:r>
           </a:p>
           <a:p>
@@ -13418,7 +13418,7 @@
               <a:spcAft>
                 <a:spcPts val="200"/>
               </a:spcAft>
-              <a:defRPr sz="1400" b="1">
+              <a:defRPr sz="1500" b="0">
                 <a:solidFill>
                   <a:srgbClr val="000000"/>
                 </a:solidFill>
@@ -13426,7 +13426,137 @@
               </a:defRPr>
             </a:pPr>
             <a:r>
+              <a:t>Speed: 50 Hz → upsampled to 100 Hz</a:t>
+            </a:r>
+          </a:p>
+          <a:p>
+            <a:pPr>
+              <a:spcBef>
+                <a:spcPts val="300"/>
+              </a:spcBef>
+              <a:spcAft>
+                <a:spcPts val="200"/>
+              </a:spcAft>
+              <a:defRPr sz="1500" b="0">
+                <a:solidFill>
+                  <a:srgbClr val="000000"/>
+                </a:solidFill>
+                <a:latin typeface="Calibri"/>
+              </a:defRPr>
+            </a:pPr>
+            <a:r>
+              <a:t>3 recording sessions combined</a:t>
+            </a:r>
+          </a:p>
+          <a:p>
+            <a:pPr>
+              <a:spcBef>
+                <a:spcPts val="300"/>
+              </a:spcBef>
+              <a:spcAft>
+                <a:spcPts val="200"/>
+              </a:spcAft>
+              <a:defRPr sz="1500" b="1">
+                <a:solidFill>
+                  <a:srgbClr val="000000"/>
+                </a:solidFill>
+                <a:latin typeface="Calibri"/>
+              </a:defRPr>
+            </a:pPr>
+            <a:r>
               <a:t>Only healthy data used for training</a:t>
+            </a:r>
+          </a:p>
+          <a:p>
+            <a:pPr algn="l">
+              <a:spcBef>
+                <a:spcPts val="400"/>
+              </a:spcBef>
+              <a:spcAft>
+                <a:spcPts val="200"/>
+              </a:spcAft>
+              <a:defRPr sz="800" b="0" i="0">
+                <a:solidFill>
+                  <a:srgbClr val="000000"/>
+                </a:solidFill>
+                <a:latin typeface="Calibri"/>
+              </a:defRPr>
+            </a:pPr>
+          </a:p>
+          <a:p>
+            <a:pPr algn="l">
+              <a:spcBef>
+                <a:spcPts val="400"/>
+              </a:spcBef>
+              <a:spcAft>
+                <a:spcPts val="200"/>
+              </a:spcAft>
+              <a:defRPr sz="1600" b="1" i="0">
+                <a:solidFill>
+                  <a:srgbClr val="005AA0"/>
+                </a:solidFill>
+                <a:latin typeface="Calibri"/>
+              </a:defRPr>
+            </a:pPr>
+            <a:r>
+              <a:t>A2D2 Statistics:</a:t>
+            </a:r>
+          </a:p>
+          <a:p>
+            <a:pPr>
+              <a:spcBef>
+                <a:spcPts val="300"/>
+              </a:spcBef>
+              <a:spcAft>
+                <a:spcPts val="200"/>
+              </a:spcAft>
+              <a:defRPr sz="1300" b="0">
+                <a:solidFill>
+                  <a:srgbClr val="000000"/>
+                </a:solidFill>
+                <a:latin typeface="Calibri"/>
+              </a:defRPr>
+            </a:pPr>
+            <a:r>
+              <a:t>Acc pedal: μ=6.99%, σ=8.70%, range [0, 52]%</a:t>
+            </a:r>
+          </a:p>
+          <a:p>
+            <a:pPr>
+              <a:spcBef>
+                <a:spcPts val="300"/>
+              </a:spcBef>
+              <a:spcAft>
+                <a:spcPts val="200"/>
+              </a:spcAft>
+              <a:defRPr sz="1300" b="0">
+                <a:solidFill>
+                  <a:srgbClr val="000000"/>
+                </a:solidFill>
+                <a:latin typeface="Calibri"/>
+              </a:defRPr>
+            </a:pPr>
+            <a:r>
+              <a:t>Speed: μ=17.21 km/h, σ=14.78, range [0, 73.4]</a:t>
+            </a:r>
+          </a:p>
+          <a:p>
+            <a:pPr>
+              <a:spcBef>
+                <a:spcPts val="300"/>
+              </a:spcBef>
+              <a:spcAft>
+                <a:spcPts val="200"/>
+              </a:spcAft>
+              <a:defRPr sz="1300" b="0">
+                <a:solidFill>
+                  <a:srgbClr val="000000"/>
+                </a:solidFill>
+                <a:latin typeface="Calibri"/>
+              </a:defRPr>
+            </a:pPr>
+            <a:r>
+              <a:t>Correlation: 0.5268</a:t>
             </a:r>
           </a:p>
         </p:txBody>
@@ -13440,7 +13570,7 @@
         <p:spPr>
           <a:xfrm>
             <a:off x="6217920" y="1417320"/>
-            <a:ext cx="5303520" cy="2560320"/>
+            <a:ext cx="5303520" cy="5029200"/>
           </a:xfrm>
           <a:prstGeom prst="rect">
             <a:avLst/>
@@ -13454,7 +13584,7 @@
           <a:lstStyle/>
           <a:p>
             <a:pPr algn="l">
-              <a:defRPr sz="1700" b="1">
+              <a:defRPr sz="1800" b="1">
                 <a:solidFill>
                   <a:srgbClr val="B41E1E"/>
                 </a:solidFill>
@@ -13473,7 +13603,7 @@
               <a:spcAft>
                 <a:spcPts val="200"/>
               </a:spcAft>
-              <a:defRPr sz="1400" b="0">
+              <a:defRPr sz="1500" b="0">
                 <a:solidFill>
                   <a:srgbClr val="000000"/>
                 </a:solidFill>
@@ -13492,7 +13622,7 @@
               <a:spcAft>
                 <a:spcPts val="200"/>
               </a:spcAft>
-              <a:defRPr sz="1400" b="0">
+              <a:defRPr sz="1500" b="0">
                 <a:solidFill>
                   <a:srgbClr val="000000"/>
                 </a:solidFill>
@@ -13511,7 +13641,7 @@
               <a:spcAft>
                 <a:spcPts val="200"/>
               </a:spcAft>
-              <a:defRPr sz="1400" b="0">
+              <a:defRPr sz="1500" b="0">
                 <a:solidFill>
                   <a:srgbClr val="000000"/>
                 </a:solidFill>
@@ -13530,7 +13660,7 @@
               <a:spcAft>
                 <a:spcPts val="200"/>
               </a:spcAft>
-              <a:defRPr sz="1400" b="0">
+              <a:defRPr sz="1500" b="0">
                 <a:solidFill>
                   <a:srgbClr val="000000"/>
                 </a:solidFill>
@@ -13538,7 +13668,7 @@
               </a:defRPr>
             </a:pPr>
             <a:r>
-              <a:t>Calibration: 89 windows (90 sec)</a:t>
+              <a:t>Calibration: 89 healthy windows (90 sec)</a:t>
             </a:r>
           </a:p>
           <a:p>
@@ -13549,7 +13679,7 @@
               <a:spcAft>
                 <a:spcPts val="200"/>
               </a:spcAft>
-              <a:defRPr sz="1400" b="1">
+              <a:defRPr sz="1500" b="1">
                 <a:solidFill>
                   <a:srgbClr val="000000"/>
                 </a:solidFill>
@@ -13558,34 +13688,194 @@
             </a:pPr>
             <a:r>
               <a:t>Cross-domain transfer: real → simulation</a:t>
+            </a:r>
+          </a:p>
+          <a:p>
+            <a:pPr algn="l">
+              <a:spcBef>
+                <a:spcPts val="400"/>
+              </a:spcBef>
+              <a:spcAft>
+                <a:spcPts val="200"/>
+              </a:spcAft>
+              <a:defRPr sz="800" b="0" i="0">
+                <a:solidFill>
+                  <a:srgbClr val="000000"/>
+                </a:solidFill>
+                <a:latin typeface="Calibri"/>
+              </a:defRPr>
+            </a:pPr>
+          </a:p>
+          <a:p>
+            <a:pPr algn="l">
+              <a:spcBef>
+                <a:spcPts val="400"/>
+              </a:spcBef>
+              <a:spcAft>
+                <a:spcPts val="200"/>
+              </a:spcAft>
+              <a:defRPr sz="1600" b="1" i="0">
+                <a:solidFill>
+                  <a:srgbClr val="005AA0"/>
+                </a:solidFill>
+                <a:latin typeface="Calibri"/>
+              </a:defRPr>
+            </a:pPr>
+            <a:r>
+              <a:t>HIL Fault Files:</a:t>
+            </a:r>
+          </a:p>
+          <a:p>
+            <a:pPr>
+              <a:spcBef>
+                <a:spcPts val="300"/>
+              </a:spcBef>
+              <a:spcAft>
+                <a:spcPts val="200"/>
+              </a:spcAft>
+              <a:defRPr sz="1300" b="0">
+                <a:solidFill>
+                  <a:srgbClr val="000000"/>
+                </a:solidFill>
+                <a:latin typeface="Calibri"/>
+              </a:defRPr>
+            </a:pPr>
+            <a:r>
+              <a:t>acc fault gain.csv (314 windows)</a:t>
+            </a:r>
+          </a:p>
+          <a:p>
+            <a:pPr>
+              <a:spcBef>
+                <a:spcPts val="300"/>
+              </a:spcBef>
+              <a:spcAft>
+                <a:spcPts val="200"/>
+              </a:spcAft>
+              <a:defRPr sz="1300" b="0">
+                <a:solidFill>
+                  <a:srgbClr val="000000"/>
+                </a:solidFill>
+                <a:latin typeface="Calibri"/>
+              </a:defRPr>
+            </a:pPr>
+            <a:r>
+              <a:t>acc fault noise.csv (321 windows)</a:t>
+            </a:r>
+          </a:p>
+          <a:p>
+            <a:pPr>
+              <a:spcBef>
+                <a:spcPts val="300"/>
+              </a:spcBef>
+              <a:spcAft>
+                <a:spcPts val="200"/>
+              </a:spcAft>
+              <a:defRPr sz="1300" b="0">
+                <a:solidFill>
+                  <a:srgbClr val="000000"/>
+                </a:solidFill>
+                <a:latin typeface="Calibri"/>
+              </a:defRPr>
+            </a:pPr>
+            <a:r>
+              <a:t>acc fault stuck.csv (315 windows)</a:t>
+            </a:r>
+          </a:p>
+          <a:p>
+            <a:pPr>
+              <a:spcBef>
+                <a:spcPts val="300"/>
+              </a:spcBef>
+              <a:spcAft>
+                <a:spcPts val="200"/>
+              </a:spcAft>
+              <a:defRPr sz="1300" b="0">
+                <a:solidFill>
+                  <a:srgbClr val="000000"/>
+                </a:solidFill>
+                <a:latin typeface="Calibri"/>
+              </a:defRPr>
+            </a:pPr>
+            <a:r>
+              <a:t>rpm fault gain.csv (321 windows)</a:t>
+            </a:r>
+          </a:p>
+          <a:p>
+            <a:pPr>
+              <a:spcBef>
+                <a:spcPts val="300"/>
+              </a:spcBef>
+              <a:spcAft>
+                <a:spcPts val="200"/>
+              </a:spcAft>
+              <a:defRPr sz="1300" b="0">
+                <a:solidFill>
+                  <a:srgbClr val="000000"/>
+                </a:solidFill>
+                <a:latin typeface="Calibri"/>
+              </a:defRPr>
+            </a:pPr>
+            <a:r>
+              <a:t>rpm fault noise.csv (315 windows)</a:t>
+            </a:r>
+          </a:p>
+          <a:p>
+            <a:pPr>
+              <a:spcBef>
+                <a:spcPts val="300"/>
+              </a:spcBef>
+              <a:spcAft>
+                <a:spcPts val="200"/>
+              </a:spcAft>
+              <a:defRPr sz="1300" b="0">
+                <a:solidFill>
+                  <a:srgbClr val="000000"/>
+                </a:solidFill>
+                <a:latin typeface="Calibri"/>
+              </a:defRPr>
+            </a:pPr>
+            <a:r>
+              <a:t>rpm fault stuck at.csv (325 windows)</a:t>
+            </a:r>
+          </a:p>
+          <a:p>
+            <a:pPr algn="l">
+              <a:spcBef>
+                <a:spcPts val="400"/>
+              </a:spcBef>
+              <a:spcAft>
+                <a:spcPts val="200"/>
+              </a:spcAft>
+              <a:defRPr sz="600" b="0" i="0">
+                <a:solidFill>
+                  <a:srgbClr val="000000"/>
+                </a:solidFill>
+                <a:latin typeface="Calibri"/>
+              </a:defRPr>
+            </a:pPr>
+          </a:p>
+          <a:p>
+            <a:pPr algn="l">
+              <a:spcBef>
+                <a:spcPts val="400"/>
+              </a:spcBef>
+              <a:spcAft>
+                <a:spcPts val="200"/>
+              </a:spcAft>
+              <a:defRPr sz="1500" b="1" i="0">
+                <a:solidFill>
+                  <a:srgbClr val="B41E1E"/>
+                </a:solidFill>
+                <a:latin typeface="Calibri"/>
+              </a:defRPr>
+            </a:pPr>
+            <a:r>
+              <a:t>Total fault windows: 1,911</a:t>
             </a:r>
           </a:p>
         </p:txBody>
       </p:sp>
-      <p:pic>
-        <p:nvPicPr>
-          <p:cNvPr id="7" name="Picture 6" descr="dataset_fusion_comparison.png"/>
-          <p:cNvPicPr>
-            <a:picLocks noChangeAspect="1"/>
-          </p:cNvPicPr>
-          <p:nvPr/>
-        </p:nvPicPr>
-        <p:blipFill>
-          <a:blip r:embed="rId2"/>
-          <a:stretch>
-            <a:fillRect/>
-          </a:stretch>
-        </p:blipFill>
-        <p:spPr>
-          <a:xfrm>
-            <a:off x="1371600" y="3840480"/>
-            <a:ext cx="9144000" cy="2743200"/>
-          </a:xfrm>
-          <a:prstGeom prst="rect">
-            <a:avLst/>
-          </a:prstGeom>
-        </p:spPr>
-      </p:pic>
     </p:spTree>
   </p:cSld>
   <p:clrMapOvr>

</xml_diff>

<commit_message>
Add Projection Head + NT-Xent Loss slide (slide 10) with transcript
- New slide covers: projection head MLP architecture (256→256→128),
  parameter breakdown (encoder 141K, projection 99K, total 240K),
  key insight that projection head is discarded after training,
  NT-Xent loss equation with cosine similarity definition,
  temperature τ=0.5, training config and loss convergence
- Updated defense script with full projection head narration
- Renumbered all subsequent slides (now 20 slides total)
- Adjusted timing markers across all slides

https://claude.ai/code/session_01DCwSioo9YwPtfdCBuDU7sq
</commit_message>
<xml_diff>
--- a/thesis_report/Defense_Presentation.pptx
+++ b/thesis_report/Defense_Presentation.pptx
@@ -27,6 +27,7 @@
     <p:sldId id="272" r:id="rId27"/>
     <p:sldId id="273" r:id="rId28"/>
     <p:sldId id="274" r:id="rId29"/>
+    <p:sldId id="275" r:id="rId30"/>
   </p:sldIdLst>
   <p:sldSz cx="12192000" cy="6858000"/>
   <p:notesSz cx="12192000" cy="6858000"/>
@@ -5977,6 +5978,825 @@
               </a:defRPr>
             </a:pPr>
             <a:r>
+              <a:t>Projection Head and NT-Xent Loss</a:t>
+            </a:r>
+          </a:p>
+        </p:txBody>
+      </p:sp>
+      <p:sp>
+        <p:nvSpPr>
+          <p:cNvPr id="5" name="TextBox 4"/>
+          <p:cNvSpPr txBox="1"/>
+          <p:nvPr/>
+        </p:nvSpPr>
+        <p:spPr>
+          <a:xfrm>
+            <a:off x="457200" y="1417320"/>
+            <a:ext cx="5303520" cy="5029200"/>
+          </a:xfrm>
+          <a:prstGeom prst="rect">
+            <a:avLst/>
+          </a:prstGeom>
+          <a:noFill/>
+        </p:spPr>
+        <p:txBody>
+          <a:bodyPr wrap="square">
+            <a:spAutoFit/>
+          </a:bodyPr>
+          <a:lstStyle/>
+          <a:p>
+            <a:pPr algn="l">
+              <a:defRPr sz="2000" b="1">
+                <a:solidFill>
+                  <a:srgbClr val="003366"/>
+                </a:solidFill>
+                <a:latin typeface="Calibri"/>
+              </a:defRPr>
+            </a:pPr>
+            <a:r>
+              <a:t>Projection Head g(·)</a:t>
+            </a:r>
+          </a:p>
+          <a:p>
+            <a:pPr algn="l">
+              <a:spcBef>
+                <a:spcPts val="400"/>
+              </a:spcBef>
+              <a:spcAft>
+                <a:spcPts val="200"/>
+              </a:spcAft>
+              <a:defRPr sz="600" b="0" i="0">
+                <a:solidFill>
+                  <a:srgbClr val="000000"/>
+                </a:solidFill>
+                <a:latin typeface="Calibri"/>
+              </a:defRPr>
+            </a:pPr>
+          </a:p>
+          <a:p>
+            <a:pPr algn="l">
+              <a:spcBef>
+                <a:spcPts val="400"/>
+              </a:spcBef>
+              <a:spcAft>
+                <a:spcPts val="200"/>
+              </a:spcAft>
+              <a:defRPr sz="1600" b="0" i="0">
+                <a:solidFill>
+                  <a:srgbClr val="000000"/>
+                </a:solidFill>
+                <a:latin typeface="Calibri"/>
+              </a:defRPr>
+            </a:pPr>
+            <a:r>
+              <a:t>Two-layer MLP after encoder:</a:t>
+            </a:r>
+          </a:p>
+          <a:p>
+            <a:pPr algn="l">
+              <a:spcBef>
+                <a:spcPts val="400"/>
+              </a:spcBef>
+              <a:spcAft>
+                <a:spcPts val="200"/>
+              </a:spcAft>
+              <a:defRPr sz="400" b="0" i="0">
+                <a:solidFill>
+                  <a:srgbClr val="000000"/>
+                </a:solidFill>
+                <a:latin typeface="Calibri"/>
+              </a:defRPr>
+            </a:pPr>
+          </a:p>
+          <a:p>
+            <a:pPr algn="l">
+              <a:spcBef>
+                <a:spcPts val="400"/>
+              </a:spcBef>
+              <a:spcAft>
+                <a:spcPts val="200"/>
+              </a:spcAft>
+              <a:defRPr sz="1500" b="1" i="0">
+                <a:solidFill>
+                  <a:srgbClr val="7D3C98"/>
+                </a:solidFill>
+                <a:latin typeface="Calibri"/>
+              </a:defRPr>
+            </a:pPr>
+            <a:r>
+              <a:t>  h  (256-d)  →  Linear(256, 256)</a:t>
+            </a:r>
+          </a:p>
+          <a:p>
+            <a:pPr algn="l">
+              <a:spcBef>
+                <a:spcPts val="400"/>
+              </a:spcBef>
+              <a:spcAft>
+                <a:spcPts val="200"/>
+              </a:spcAft>
+              <a:defRPr sz="1500" b="0" i="0">
+                <a:solidFill>
+                  <a:srgbClr val="505050"/>
+                </a:solidFill>
+                <a:latin typeface="Calibri"/>
+              </a:defRPr>
+            </a:pPr>
+            <a:r>
+              <a:t>                     →  BatchNorm + ReLU</a:t>
+            </a:r>
+          </a:p>
+          <a:p>
+            <a:pPr algn="l">
+              <a:spcBef>
+                <a:spcPts val="400"/>
+              </a:spcBef>
+              <a:spcAft>
+                <a:spcPts val="200"/>
+              </a:spcAft>
+              <a:defRPr sz="1500" b="1" i="0">
+                <a:solidFill>
+                  <a:srgbClr val="7D3C98"/>
+                </a:solidFill>
+                <a:latin typeface="Calibri"/>
+              </a:defRPr>
+            </a:pPr>
+            <a:r>
+              <a:t>                     →  Linear(256, 128)</a:t>
+            </a:r>
+          </a:p>
+          <a:p>
+            <a:pPr algn="l">
+              <a:spcBef>
+                <a:spcPts val="400"/>
+              </a:spcBef>
+              <a:spcAft>
+                <a:spcPts val="200"/>
+              </a:spcAft>
+              <a:defRPr sz="1500" b="1" i="0">
+                <a:solidFill>
+                  <a:srgbClr val="B41E1E"/>
+                </a:solidFill>
+                <a:latin typeface="Calibri"/>
+              </a:defRPr>
+            </a:pPr>
+            <a:r>
+              <a:t>  z  (128-d)  ←  L2 Normalize</a:t>
+            </a:r>
+          </a:p>
+          <a:p>
+            <a:pPr algn="l">
+              <a:spcBef>
+                <a:spcPts val="400"/>
+              </a:spcBef>
+              <a:spcAft>
+                <a:spcPts val="200"/>
+              </a:spcAft>
+              <a:defRPr sz="800" b="0" i="0">
+                <a:solidFill>
+                  <a:srgbClr val="000000"/>
+                </a:solidFill>
+                <a:latin typeface="Calibri"/>
+              </a:defRPr>
+            </a:pPr>
+          </a:p>
+          <a:p>
+            <a:pPr algn="l">
+              <a:spcBef>
+                <a:spcPts val="400"/>
+              </a:spcBef>
+              <a:spcAft>
+                <a:spcPts val="200"/>
+              </a:spcAft>
+              <a:defRPr sz="1700" b="1" i="0">
+                <a:solidFill>
+                  <a:srgbClr val="005AA0"/>
+                </a:solidFill>
+                <a:latin typeface="Calibri"/>
+              </a:defRPr>
+            </a:pPr>
+            <a:r>
+              <a:t>Parameters:</a:t>
+            </a:r>
+          </a:p>
+          <a:p>
+            <a:pPr>
+              <a:spcBef>
+                <a:spcPts val="300"/>
+              </a:spcBef>
+              <a:spcAft>
+                <a:spcPts val="200"/>
+              </a:spcAft>
+              <a:defRPr sz="1500" b="0">
+                <a:solidFill>
+                  <a:srgbClr val="000000"/>
+                </a:solidFill>
+                <a:latin typeface="Calibri"/>
+              </a:defRPr>
+            </a:pPr>
+            <a:r>
+              <a:t>Encoder f(·):     141,504 params</a:t>
+            </a:r>
+          </a:p>
+          <a:p>
+            <a:pPr>
+              <a:spcBef>
+                <a:spcPts val="300"/>
+              </a:spcBef>
+              <a:spcAft>
+                <a:spcPts val="200"/>
+              </a:spcAft>
+              <a:defRPr sz="1500" b="0">
+                <a:solidFill>
+                  <a:srgbClr val="000000"/>
+                </a:solidFill>
+                <a:latin typeface="Calibri"/>
+              </a:defRPr>
+            </a:pPr>
+            <a:r>
+              <a:t>Projection g(·):   99,200 params</a:t>
+            </a:r>
+          </a:p>
+          <a:p>
+            <a:pPr>
+              <a:spcBef>
+                <a:spcPts val="300"/>
+              </a:spcBef>
+              <a:spcAft>
+                <a:spcPts val="200"/>
+              </a:spcAft>
+              <a:defRPr sz="1500" b="1">
+                <a:solidFill>
+                  <a:srgbClr val="000000"/>
+                </a:solidFill>
+                <a:latin typeface="Calibri"/>
+              </a:defRPr>
+            </a:pPr>
+            <a:r>
+              <a:t>Total:              240,704 params</a:t>
+            </a:r>
+          </a:p>
+          <a:p>
+            <a:pPr algn="l">
+              <a:spcBef>
+                <a:spcPts val="400"/>
+              </a:spcBef>
+              <a:spcAft>
+                <a:spcPts val="200"/>
+              </a:spcAft>
+              <a:defRPr sz="800" b="0" i="0">
+                <a:solidFill>
+                  <a:srgbClr val="000000"/>
+                </a:solidFill>
+                <a:latin typeface="Calibri"/>
+              </a:defRPr>
+            </a:pPr>
+          </a:p>
+          <a:p>
+            <a:pPr algn="l">
+              <a:spcBef>
+                <a:spcPts val="400"/>
+              </a:spcBef>
+              <a:spcAft>
+                <a:spcPts val="200"/>
+              </a:spcAft>
+              <a:defRPr sz="1700" b="1" i="0">
+                <a:solidFill>
+                  <a:srgbClr val="B41E1E"/>
+                </a:solidFill>
+                <a:latin typeface="Calibri"/>
+              </a:defRPr>
+            </a:pPr>
+            <a:r>
+              <a:t>Key Insight:</a:t>
+            </a:r>
+          </a:p>
+          <a:p>
+            <a:pPr algn="l">
+              <a:spcBef>
+                <a:spcPts val="400"/>
+              </a:spcBef>
+              <a:spcAft>
+                <a:spcPts val="200"/>
+              </a:spcAft>
+              <a:defRPr sz="1400" b="0" i="0">
+                <a:solidFill>
+                  <a:srgbClr val="000000"/>
+                </a:solidFill>
+                <a:latin typeface="Calibri"/>
+              </a:defRPr>
+            </a:pPr>
+            <a:r>
+              <a:t>  Projection head is discarded after training.</a:t>
+            </a:r>
+          </a:p>
+          <a:p>
+            <a:pPr algn="l">
+              <a:spcBef>
+                <a:spcPts val="400"/>
+              </a:spcBef>
+              <a:spcAft>
+                <a:spcPts val="200"/>
+              </a:spcAft>
+              <a:defRPr sz="1400" b="0" i="0">
+                <a:solidFill>
+                  <a:srgbClr val="000000"/>
+                </a:solidFill>
+                <a:latin typeface="Calibri"/>
+              </a:defRPr>
+            </a:pPr>
+            <a:r>
+              <a:t>  Only encoder representations h are used</a:t>
+            </a:r>
+          </a:p>
+          <a:p>
+            <a:pPr algn="l">
+              <a:spcBef>
+                <a:spcPts val="400"/>
+              </a:spcBef>
+              <a:spcAft>
+                <a:spcPts val="200"/>
+              </a:spcAft>
+              <a:defRPr sz="1400" b="0" i="0">
+                <a:solidFill>
+                  <a:srgbClr val="000000"/>
+                </a:solidFill>
+                <a:latin typeface="Calibri"/>
+              </a:defRPr>
+            </a:pPr>
+            <a:r>
+              <a:t>  for downstream anomaly detection.</a:t>
+            </a:r>
+          </a:p>
+        </p:txBody>
+      </p:sp>
+      <p:sp>
+        <p:nvSpPr>
+          <p:cNvPr id="6" name="TextBox 5"/>
+          <p:cNvSpPr txBox="1"/>
+          <p:nvPr/>
+        </p:nvSpPr>
+        <p:spPr>
+          <a:xfrm>
+            <a:off x="6217920" y="1417320"/>
+            <a:ext cx="5486400" cy="5029200"/>
+          </a:xfrm>
+          <a:prstGeom prst="rect">
+            <a:avLst/>
+          </a:prstGeom>
+          <a:noFill/>
+        </p:spPr>
+        <p:txBody>
+          <a:bodyPr wrap="square">
+            <a:spAutoFit/>
+          </a:bodyPr>
+          <a:lstStyle/>
+          <a:p>
+            <a:pPr algn="l">
+              <a:defRPr sz="1800" b="1">
+                <a:solidFill>
+                  <a:srgbClr val="003366"/>
+                </a:solidFill>
+                <a:latin typeface="Calibri"/>
+              </a:defRPr>
+            </a:pPr>
+            <a:r>
+              <a:t>NT-Xent Loss (Contrastive Objective)</a:t>
+            </a:r>
+          </a:p>
+          <a:p>
+            <a:pPr algn="l">
+              <a:spcBef>
+                <a:spcPts val="400"/>
+              </a:spcBef>
+              <a:spcAft>
+                <a:spcPts val="200"/>
+              </a:spcAft>
+              <a:defRPr sz="800" b="0" i="0">
+                <a:solidFill>
+                  <a:srgbClr val="000000"/>
+                </a:solidFill>
+                <a:latin typeface="Calibri"/>
+              </a:defRPr>
+            </a:pPr>
+          </a:p>
+        </p:txBody>
+      </p:sp>
+      <p:sp>
+        <p:nvSpPr>
+          <p:cNvPr id="7" name="Rounded Rectangle 6"/>
+          <p:cNvSpPr/>
+          <p:nvPr/>
+        </p:nvSpPr>
+        <p:spPr>
+          <a:xfrm>
+            <a:off x="6400800" y="2103120"/>
+            <a:ext cx="5029200" cy="1463040"/>
+          </a:xfrm>
+          <a:prstGeom prst="roundRect">
+            <a:avLst/>
+          </a:prstGeom>
+          <a:solidFill>
+            <a:srgbClr val="F5F5FF"/>
+          </a:solidFill>
+          <a:ln w="19050">
+            <a:solidFill>
+              <a:srgbClr val="005AA0"/>
+            </a:solidFill>
+          </a:ln>
+        </p:spPr>
+        <p:style>
+          <a:lnRef idx="1">
+            <a:schemeClr val="accent1"/>
+          </a:lnRef>
+          <a:fillRef idx="3">
+            <a:schemeClr val="accent1"/>
+          </a:fillRef>
+          <a:effectRef idx="2">
+            <a:schemeClr val="accent1"/>
+          </a:effectRef>
+          <a:fontRef idx="minor">
+            <a:schemeClr val="lt1"/>
+          </a:fontRef>
+        </p:style>
+        <p:txBody>
+          <a:bodyPr rtlCol="0" anchor="ctr" wrap="square"/>
+          <a:lstStyle/>
+          <a:p>
+            <a:pPr algn="l">
+              <a:defRPr sz="600" b="0">
+                <a:solidFill>
+                  <a:srgbClr val="000000"/>
+                </a:solidFill>
+                <a:latin typeface="Calibri"/>
+              </a:defRPr>
+            </a:pPr>
+          </a:p>
+          <a:p>
+            <a:pPr algn="ctr">
+              <a:spcBef>
+                <a:spcPts val="400"/>
+              </a:spcBef>
+              <a:spcAft>
+                <a:spcPts val="200"/>
+              </a:spcAft>
+              <a:defRPr sz="1600" b="1" i="0">
+                <a:solidFill>
+                  <a:srgbClr val="000000"/>
+                </a:solidFill>
+                <a:latin typeface="Calibri"/>
+              </a:defRPr>
+            </a:pPr>
+            <a:r>
+              <a:t>ℓ(i,j) = − log [ exp(sim(zᵢ, zⱼ) / τ) ]</a:t>
+            </a:r>
+          </a:p>
+          <a:p>
+            <a:pPr algn="ctr">
+              <a:spcBef>
+                <a:spcPts val="400"/>
+              </a:spcBef>
+              <a:spcAft>
+                <a:spcPts val="200"/>
+              </a:spcAft>
+              <a:defRPr sz="1200" b="0" i="0">
+                <a:solidFill>
+                  <a:srgbClr val="005AA0"/>
+                </a:solidFill>
+                <a:latin typeface="Calibri"/>
+              </a:defRPr>
+            </a:pPr>
+            <a:r>
+              <a:t>───────────────────────</a:t>
+            </a:r>
+          </a:p>
+          <a:p>
+            <a:pPr algn="ctr">
+              <a:spcBef>
+                <a:spcPts val="400"/>
+              </a:spcBef>
+              <a:spcAft>
+                <a:spcPts val="200"/>
+              </a:spcAft>
+              <a:defRPr sz="1600" b="1" i="0">
+                <a:solidFill>
+                  <a:srgbClr val="000000"/>
+                </a:solidFill>
+                <a:latin typeface="Calibri"/>
+              </a:defRPr>
+            </a:pPr>
+            <a:r>
+              <a:t>Σ(k≠i) exp(sim(zᵢ, zₖ) / τ)</a:t>
+            </a:r>
+          </a:p>
+        </p:txBody>
+      </p:sp>
+      <p:sp>
+        <p:nvSpPr>
+          <p:cNvPr id="8" name="TextBox 7"/>
+          <p:cNvSpPr txBox="1"/>
+          <p:nvPr/>
+        </p:nvSpPr>
+        <p:spPr>
+          <a:xfrm>
+            <a:off x="6217920" y="3749039"/>
+            <a:ext cx="5486400" cy="2926080"/>
+          </a:xfrm>
+          <a:prstGeom prst="rect">
+            <a:avLst/>
+          </a:prstGeom>
+          <a:noFill/>
+        </p:spPr>
+        <p:txBody>
+          <a:bodyPr wrap="square">
+            <a:spAutoFit/>
+          </a:bodyPr>
+          <a:lstStyle/>
+          <a:p>
+            <a:pPr algn="l">
+              <a:defRPr sz="1600" b="1">
+                <a:solidFill>
+                  <a:srgbClr val="000000"/>
+                </a:solidFill>
+                <a:latin typeface="Calibri"/>
+              </a:defRPr>
+            </a:pPr>
+            <a:r>
+              <a:t>Where:</a:t>
+            </a:r>
+          </a:p>
+          <a:p>
+            <a:pPr>
+              <a:spcBef>
+                <a:spcPts val="300"/>
+              </a:spcBef>
+              <a:spcAft>
+                <a:spcPts val="200"/>
+              </a:spcAft>
+              <a:defRPr sz="1400" b="0">
+                <a:solidFill>
+                  <a:srgbClr val="000000"/>
+                </a:solidFill>
+                <a:latin typeface="Calibri"/>
+              </a:defRPr>
+            </a:pPr>
+            <a:r>
+              <a:t>sim(u, v) = uᵀv / (||u|| · ||v||)    (cosine similarity)</a:t>
+            </a:r>
+          </a:p>
+          <a:p>
+            <a:pPr>
+              <a:spcBef>
+                <a:spcPts val="300"/>
+              </a:spcBef>
+              <a:spcAft>
+                <a:spcPts val="200"/>
+              </a:spcAft>
+              <a:defRPr sz="1400" b="0">
+                <a:solidFill>
+                  <a:srgbClr val="000000"/>
+                </a:solidFill>
+                <a:latin typeface="Calibri"/>
+              </a:defRPr>
+            </a:pPr>
+            <a:r>
+              <a:t>τ = 0.5    (temperature parameter)</a:t>
+            </a:r>
+          </a:p>
+          <a:p>
+            <a:pPr>
+              <a:spcBef>
+                <a:spcPts val="300"/>
+              </a:spcBef>
+              <a:spcAft>
+                <a:spcPts val="200"/>
+              </a:spcAft>
+              <a:defRPr sz="1400" b="0">
+                <a:solidFill>
+                  <a:srgbClr val="00783C"/>
+                </a:solidFill>
+                <a:latin typeface="Calibri"/>
+              </a:defRPr>
+            </a:pPr>
+            <a:r>
+              <a:t>(zᵢ, zⱼ) = positive pair (same window)</a:t>
+            </a:r>
+          </a:p>
+          <a:p>
+            <a:pPr>
+              <a:spcBef>
+                <a:spcPts val="300"/>
+              </a:spcBef>
+              <a:spcAft>
+                <a:spcPts val="200"/>
+              </a:spcAft>
+              <a:defRPr sz="1400" b="0">
+                <a:solidFill>
+                  <a:srgbClr val="B41E1E"/>
+                </a:solidFill>
+                <a:latin typeface="Calibri"/>
+              </a:defRPr>
+            </a:pPr>
+            <a:r>
+              <a:t>(zᵢ, zₖ) for k≠i = negative pairs</a:t>
+            </a:r>
+          </a:p>
+          <a:p>
+            <a:pPr algn="l">
+              <a:spcBef>
+                <a:spcPts val="400"/>
+              </a:spcBef>
+              <a:spcAft>
+                <a:spcPts val="200"/>
+              </a:spcAft>
+              <a:defRPr sz="800" b="0" i="0">
+                <a:solidFill>
+                  <a:srgbClr val="000000"/>
+                </a:solidFill>
+                <a:latin typeface="Calibri"/>
+              </a:defRPr>
+            </a:pPr>
+          </a:p>
+          <a:p>
+            <a:pPr algn="l">
+              <a:spcBef>
+                <a:spcPts val="400"/>
+              </a:spcBef>
+              <a:spcAft>
+                <a:spcPts val="200"/>
+              </a:spcAft>
+              <a:defRPr sz="1700" b="1" i="0">
+                <a:solidFill>
+                  <a:srgbClr val="005AA0"/>
+                </a:solidFill>
+                <a:latin typeface="Calibri"/>
+              </a:defRPr>
+            </a:pPr>
+            <a:r>
+              <a:t>Training Configuration:</a:t>
+            </a:r>
+          </a:p>
+          <a:p>
+            <a:pPr>
+              <a:spcBef>
+                <a:spcPts val="300"/>
+              </a:spcBef>
+              <a:spcAft>
+                <a:spcPts val="200"/>
+              </a:spcAft>
+              <a:defRPr sz="1400" b="0">
+                <a:solidFill>
+                  <a:srgbClr val="000000"/>
+                </a:solidFill>
+                <a:latin typeface="Calibri"/>
+              </a:defRPr>
+            </a:pPr>
+            <a:r>
+              <a:t>Batch size = 128 → 254 negatives per sample</a:t>
+            </a:r>
+          </a:p>
+          <a:p>
+            <a:pPr>
+              <a:spcBef>
+                <a:spcPts val="300"/>
+              </a:spcBef>
+              <a:spcAft>
+                <a:spcPts val="200"/>
+              </a:spcAft>
+              <a:defRPr sz="1400" b="0">
+                <a:solidFill>
+                  <a:srgbClr val="000000"/>
+                </a:solidFill>
+                <a:latin typeface="Calibri"/>
+              </a:defRPr>
+            </a:pPr>
+            <a:r>
+              <a:t>Epochs = 50, LR = 0.001 (Adam)</a:t>
+            </a:r>
+          </a:p>
+          <a:p>
+            <a:pPr>
+              <a:spcBef>
+                <a:spcPts val="300"/>
+              </a:spcBef>
+              <a:spcAft>
+                <a:spcPts val="200"/>
+              </a:spcAft>
+              <a:defRPr sz="1400" b="1">
+                <a:solidFill>
+                  <a:srgbClr val="000000"/>
+                </a:solidFill>
+                <a:latin typeface="Calibri"/>
+              </a:defRPr>
+            </a:pPr>
+            <a:r>
+              <a:t>Loss: 4.0855 → 3.7955 (7.1% reduction)</a:t>
+            </a:r>
+          </a:p>
+          <a:p>
+            <a:pPr>
+              <a:spcBef>
+                <a:spcPts val="300"/>
+              </a:spcBef>
+              <a:spcAft>
+                <a:spcPts val="200"/>
+              </a:spcAft>
+              <a:defRPr sz="1400" b="0">
+                <a:solidFill>
+                  <a:srgbClr val="000000"/>
+                </a:solidFill>
+                <a:latin typeface="Calibri"/>
+              </a:defRPr>
+            </a:pPr>
+            <a:r>
+              <a:t>Training time: 118.08 s on CPU</a:t>
+            </a:r>
+          </a:p>
+        </p:txBody>
+      </p:sp>
+    </p:spTree>
+  </p:cSld>
+  <p:clrMapOvr>
+    <a:masterClrMapping/>
+  </p:clrMapOvr>
+</p:sld>
+</file>
+
+<file path=ppt/slides/slide11.xml><?xml version="1.0" encoding="utf-8"?>
+<p:sld xmlns:a="http://schemas.openxmlformats.org/drawingml/2006/main" xmlns:p="http://schemas.openxmlformats.org/presentationml/2006/main" xmlns:r="http://schemas.openxmlformats.org/officeDocument/2006/relationships">
+  <p:cSld>
+    <p:spTree>
+      <p:nvGrpSpPr>
+        <p:cNvPr id="1" name=""/>
+        <p:cNvGrpSpPr/>
+        <p:nvPr/>
+      </p:nvGrpSpPr>
+      <p:grpSpPr/>
+      <p:sp>
+        <p:nvSpPr>
+          <p:cNvPr id="2" name="Title 1"/>
+          <p:cNvSpPr>
+            <a:spLocks noGrp="1"/>
+          </p:cNvSpPr>
+          <p:nvPr>
+            <p:ph type="title"/>
+          </p:nvPr>
+        </p:nvSpPr>
+        <p:spPr/>
+        <p:txBody>
+          <a:bodyPr/>
+          <a:lstStyle/>
+          <a:p/>
+        </p:txBody>
+      </p:sp>
+      <p:sp>
+        <p:nvSpPr>
+          <p:cNvPr id="3" name="Text Placeholder 2"/>
+          <p:cNvSpPr>
+            <a:spLocks noGrp="1"/>
+          </p:cNvSpPr>
+          <p:nvPr>
+            <p:ph type="body" idx="1"/>
+          </p:nvPr>
+        </p:nvSpPr>
+        <p:spPr/>
+        <p:txBody>
+          <a:bodyPr/>
+          <a:lstStyle/>
+          <a:p/>
+        </p:txBody>
+      </p:sp>
+      <p:sp>
+        <p:nvSpPr>
+          <p:cNvPr id="4" name="TextBox 3"/>
+          <p:cNvSpPr txBox="1"/>
+          <p:nvPr/>
+        </p:nvSpPr>
+        <p:spPr>
+          <a:xfrm>
+            <a:off x="457200" y="777240"/>
+            <a:ext cx="11247120" cy="502920"/>
+          </a:xfrm>
+          <a:prstGeom prst="rect">
+            <a:avLst/>
+          </a:prstGeom>
+          <a:noFill/>
+        </p:spPr>
+        <p:txBody>
+          <a:bodyPr wrap="square">
+            <a:spAutoFit/>
+          </a:bodyPr>
+          <a:lstStyle/>
+          <a:p>
+            <a:pPr algn="l">
+              <a:defRPr sz="2600" b="1">
+                <a:solidFill>
+                  <a:srgbClr val="003366"/>
+                </a:solidFill>
+                <a:latin typeface="Calibri"/>
+              </a:defRPr>
+            </a:pPr>
+            <a:r>
               <a:t>Data Preprocessing and Augmentation</a:t>
             </a:r>
           </a:p>
@@ -6620,7 +7440,7 @@
 </p:sld>
 </file>
 
-<file path=ppt/slides/slide11.xml><?xml version="1.0" encoding="utf-8"?>
+<file path=ppt/slides/slide12.xml><?xml version="1.0" encoding="utf-8"?>
 <p:sld xmlns:a="http://schemas.openxmlformats.org/drawingml/2006/main" xmlns:p="http://schemas.openxmlformats.org/presentationml/2006/main" xmlns:r="http://schemas.openxmlformats.org/officeDocument/2006/relationships">
   <p:cSld>
     <p:spTree>
@@ -6956,7 +7776,7 @@
 </p:sld>
 </file>
 
-<file path=ppt/slides/slide12.xml><?xml version="1.0" encoding="utf-8"?>
+<file path=ppt/slides/slide13.xml><?xml version="1.0" encoding="utf-8"?>
 <p:sld xmlns:a="http://schemas.openxmlformats.org/drawingml/2006/main" xmlns:p="http://schemas.openxmlformats.org/presentationml/2006/main" xmlns:r="http://schemas.openxmlformats.org/officeDocument/2006/relationships">
   <p:cSld>
     <p:spTree>
@@ -7984,7 +8804,7 @@
 </p:sld>
 </file>
 
-<file path=ppt/slides/slide13.xml><?xml version="1.0" encoding="utf-8"?>
+<file path=ppt/slides/slide14.xml><?xml version="1.0" encoding="utf-8"?>
 <p:sld xmlns:a="http://schemas.openxmlformats.org/drawingml/2006/main" xmlns:p="http://schemas.openxmlformats.org/presentationml/2006/main" xmlns:r="http://schemas.openxmlformats.org/officeDocument/2006/relationships">
   <p:cSld>
     <p:spTree>
@@ -8874,7 +9694,7 @@
 </p:sld>
 </file>
 
-<file path=ppt/slides/slide14.xml><?xml version="1.0" encoding="utf-8"?>
+<file path=ppt/slides/slide15.xml><?xml version="1.0" encoding="utf-8"?>
 <p:sld xmlns:a="http://schemas.openxmlformats.org/drawingml/2006/main" xmlns:p="http://schemas.openxmlformats.org/presentationml/2006/main" xmlns:r="http://schemas.openxmlformats.org/officeDocument/2006/relationships">
   <p:cSld>
     <p:spTree>
@@ -9403,7 +10223,7 @@
 </p:sld>
 </file>
 
-<file path=ppt/slides/slide15.xml><?xml version="1.0" encoding="utf-8"?>
+<file path=ppt/slides/slide16.xml><?xml version="1.0" encoding="utf-8"?>
 <p:sld xmlns:a="http://schemas.openxmlformats.org/drawingml/2006/main" xmlns:p="http://schemas.openxmlformats.org/presentationml/2006/main" xmlns:r="http://schemas.openxmlformats.org/officeDocument/2006/relationships">
   <p:cSld>
     <p:spTree>
@@ -9594,7 +10414,7 @@
 </p:sld>
 </file>
 
-<file path=ppt/slides/slide16.xml><?xml version="1.0" encoding="utf-8"?>
+<file path=ppt/slides/slide17.xml><?xml version="1.0" encoding="utf-8"?>
 <p:sld xmlns:a="http://schemas.openxmlformats.org/drawingml/2006/main" xmlns:p="http://schemas.openxmlformats.org/presentationml/2006/main" xmlns:r="http://schemas.openxmlformats.org/officeDocument/2006/relationships">
   <p:cSld>
     <p:spTree>
@@ -10616,428 +11436,6 @@
 </p:sld>
 </file>
 
-<file path=ppt/slides/slide17.xml><?xml version="1.0" encoding="utf-8"?>
-<p:sld xmlns:a="http://schemas.openxmlformats.org/drawingml/2006/main" xmlns:p="http://schemas.openxmlformats.org/presentationml/2006/main" xmlns:r="http://schemas.openxmlformats.org/officeDocument/2006/relationships">
-  <p:cSld>
-    <p:spTree>
-      <p:nvGrpSpPr>
-        <p:cNvPr id="1" name=""/>
-        <p:cNvGrpSpPr/>
-        <p:nvPr/>
-      </p:nvGrpSpPr>
-      <p:grpSpPr/>
-      <p:sp>
-        <p:nvSpPr>
-          <p:cNvPr id="2" name="Title 1"/>
-          <p:cNvSpPr>
-            <a:spLocks noGrp="1"/>
-          </p:cNvSpPr>
-          <p:nvPr>
-            <p:ph type="title"/>
-          </p:nvPr>
-        </p:nvSpPr>
-        <p:spPr/>
-        <p:txBody>
-          <a:bodyPr/>
-          <a:lstStyle/>
-          <a:p/>
-        </p:txBody>
-      </p:sp>
-      <p:sp>
-        <p:nvSpPr>
-          <p:cNvPr id="3" name="Text Placeholder 2"/>
-          <p:cNvSpPr>
-            <a:spLocks noGrp="1"/>
-          </p:cNvSpPr>
-          <p:nvPr>
-            <p:ph type="body" idx="1"/>
-          </p:nvPr>
-        </p:nvSpPr>
-        <p:spPr/>
-        <p:txBody>
-          <a:bodyPr/>
-          <a:lstStyle/>
-          <a:p/>
-        </p:txBody>
-      </p:sp>
-      <p:sp>
-        <p:nvSpPr>
-          <p:cNvPr id="4" name="TextBox 3"/>
-          <p:cNvSpPr txBox="1"/>
-          <p:nvPr/>
-        </p:nvSpPr>
-        <p:spPr>
-          <a:xfrm>
-            <a:off x="457200" y="777240"/>
-            <a:ext cx="11247120" cy="502920"/>
-          </a:xfrm>
-          <a:prstGeom prst="rect">
-            <a:avLst/>
-          </a:prstGeom>
-          <a:noFill/>
-        </p:spPr>
-        <p:txBody>
-          <a:bodyPr wrap="square">
-            <a:spAutoFit/>
-          </a:bodyPr>
-          <a:lstStyle/>
-          <a:p>
-            <a:pPr algn="l">
-              <a:defRPr sz="2600" b="1">
-                <a:solidFill>
-                  <a:srgbClr val="003366"/>
-                </a:solidFill>
-                <a:latin typeface="Calibri"/>
-              </a:defRPr>
-            </a:pPr>
-            <a:r>
-              <a:t>Conclusion</a:t>
-            </a:r>
-          </a:p>
-        </p:txBody>
-      </p:sp>
-      <p:sp>
-        <p:nvSpPr>
-          <p:cNvPr id="5" name="Rounded Rectangle 4"/>
-          <p:cNvSpPr/>
-          <p:nvPr/>
-        </p:nvSpPr>
-        <p:spPr>
-          <a:xfrm>
-            <a:off x="365760" y="1371600"/>
-            <a:ext cx="11338560" cy="1051560"/>
-          </a:xfrm>
-          <a:prstGeom prst="roundRect">
-            <a:avLst/>
-          </a:prstGeom>
-          <a:solidFill>
-            <a:srgbClr val="E6F0FF"/>
-          </a:solidFill>
-          <a:ln w="12700">
-            <a:solidFill>
-              <a:srgbClr val="005AA0"/>
-            </a:solidFill>
-          </a:ln>
-        </p:spPr>
-        <p:style>
-          <a:lnRef idx="1">
-            <a:schemeClr val="accent1"/>
-          </a:lnRef>
-          <a:fillRef idx="3">
-            <a:schemeClr val="accent1"/>
-          </a:fillRef>
-          <a:effectRef idx="2">
-            <a:schemeClr val="accent1"/>
-          </a:effectRef>
-          <a:fontRef idx="minor">
-            <a:schemeClr val="lt1"/>
-          </a:fontRef>
-        </p:style>
-        <p:txBody>
-          <a:bodyPr rtlCol="0" anchor="ctr" wrap="square"/>
-          <a:lstStyle/>
-          <a:p>
-            <a:pPr algn="l">
-              <a:defRPr sz="1400" b="0">
-                <a:solidFill>
-                  <a:srgbClr val="000000"/>
-                </a:solidFill>
-                <a:latin typeface="Calibri"/>
-              </a:defRPr>
-            </a:pPr>
-            <a:r>
-              <a:t>RQ1:  Self-supervised representations from healthy A2D2 data successfully detect sensor faults in HIL data.</a:t>
-            </a:r>
-          </a:p>
-          <a:p>
-            <a:pPr algn="l">
-              <a:spcBef>
-                <a:spcPts val="400"/>
-              </a:spcBef>
-              <a:spcAft>
-                <a:spcPts val="200"/>
-              </a:spcAft>
-              <a:defRPr sz="1400" b="1" i="0">
-                <a:solidFill>
-                  <a:srgbClr val="00783C"/>
-                </a:solidFill>
-                <a:latin typeface="Calibri"/>
-              </a:defRPr>
-            </a:pPr>
-            <a:r>
-              <a:t>Cross-domain transfer works without any labeled fault examples. ✓</a:t>
-            </a:r>
-          </a:p>
-        </p:txBody>
-      </p:sp>
-      <p:sp>
-        <p:nvSpPr>
-          <p:cNvPr id="6" name="Rounded Rectangle 5"/>
-          <p:cNvSpPr/>
-          <p:nvPr/>
-        </p:nvSpPr>
-        <p:spPr>
-          <a:xfrm>
-            <a:off x="365760" y="2606040"/>
-            <a:ext cx="11338560" cy="1051560"/>
-          </a:xfrm>
-          <a:prstGeom prst="roundRect">
-            <a:avLst/>
-          </a:prstGeom>
-          <a:solidFill>
-            <a:srgbClr val="E6FFF0"/>
-          </a:solidFill>
-          <a:ln w="12700">
-            <a:solidFill>
-              <a:srgbClr val="00783C"/>
-            </a:solidFill>
-          </a:ln>
-        </p:spPr>
-        <p:style>
-          <a:lnRef idx="1">
-            <a:schemeClr val="accent1"/>
-          </a:lnRef>
-          <a:fillRef idx="3">
-            <a:schemeClr val="accent1"/>
-          </a:fillRef>
-          <a:effectRef idx="2">
-            <a:schemeClr val="accent1"/>
-          </a:effectRef>
-          <a:fontRef idx="minor">
-            <a:schemeClr val="lt1"/>
-          </a:fontRef>
-        </p:style>
-        <p:txBody>
-          <a:bodyPr rtlCol="0" anchor="ctr" wrap="square"/>
-          <a:lstStyle/>
-          <a:p>
-            <a:pPr algn="l">
-              <a:defRPr sz="1400" b="0">
-                <a:solidFill>
-                  <a:srgbClr val="000000"/>
-                </a:solidFill>
-                <a:latin typeface="Calibri"/>
-              </a:defRPr>
-            </a:pPr>
-            <a:r>
-              <a:t>RQ2:  Per-fault precision = 1.0 at all thresholds. Recall: 70.7% → 93.3%.</a:t>
-            </a:r>
-          </a:p>
-          <a:p>
-            <a:pPr algn="l">
-              <a:spcBef>
-                <a:spcPts val="400"/>
-              </a:spcBef>
-              <a:spcAft>
-                <a:spcPts val="200"/>
-              </a:spcAft>
-              <a:defRPr sz="1400" b="1" i="0">
-                <a:solidFill>
-                  <a:srgbClr val="00783C"/>
-                </a:solidFill>
-                <a:latin typeface="Calibri"/>
-              </a:defRPr>
-            </a:pPr>
-            <a:r>
-              <a:t>Optimal: 40th percentile (F1 = 0.965). ✓</a:t>
-            </a:r>
-          </a:p>
-        </p:txBody>
-      </p:sp>
-      <p:sp>
-        <p:nvSpPr>
-          <p:cNvPr id="7" name="Rounded Rectangle 6"/>
-          <p:cNvSpPr/>
-          <p:nvPr/>
-        </p:nvSpPr>
-        <p:spPr>
-          <a:xfrm>
-            <a:off x="365760" y="3840480"/>
-            <a:ext cx="11338560" cy="1051560"/>
-          </a:xfrm>
-          <a:prstGeom prst="roundRect">
-            <a:avLst/>
-          </a:prstGeom>
-          <a:solidFill>
-            <a:srgbClr val="FFF0E6"/>
-          </a:solidFill>
-          <a:ln w="12700">
-            <a:solidFill>
-              <a:srgbClr val="C86400"/>
-            </a:solidFill>
-          </a:ln>
-        </p:spPr>
-        <p:style>
-          <a:lnRef idx="1">
-            <a:schemeClr val="accent1"/>
-          </a:lnRef>
-          <a:fillRef idx="3">
-            <a:schemeClr val="accent1"/>
-          </a:fillRef>
-          <a:effectRef idx="2">
-            <a:schemeClr val="accent1"/>
-          </a:effectRef>
-          <a:fontRef idx="minor">
-            <a:schemeClr val="lt1"/>
-          </a:fontRef>
-        </p:style>
-        <p:txBody>
-          <a:bodyPr rtlCol="0" anchor="ctr" wrap="square"/>
-          <a:lstStyle/>
-          <a:p>
-            <a:pPr algn="l">
-              <a:defRPr sz="1400" b="0">
-                <a:solidFill>
-                  <a:srgbClr val="000000"/>
-                </a:solidFill>
-                <a:latin typeface="Calibri"/>
-              </a:defRPr>
-            </a:pPr>
-            <a:r>
-              <a:t>RQ3:  Speed gain = 99.7% recall (easiest). Acc stuck = 89.8% (hardest).</a:t>
-            </a:r>
-          </a:p>
-          <a:p>
-            <a:pPr algn="l">
-              <a:spcBef>
-                <a:spcPts val="400"/>
-              </a:spcBef>
-              <a:spcAft>
-                <a:spcPts val="200"/>
-              </a:spcAft>
-              <a:defRPr sz="1400" b="1" i="0">
-                <a:solidFill>
-                  <a:srgbClr val="C86400"/>
-                </a:solidFill>
-                <a:latin typeface="Calibri"/>
-              </a:defRPr>
-            </a:pPr>
-            <a:r>
-              <a:t>Detectability correlates with physical severity and sensor variability. ✓</a:t>
-            </a:r>
-          </a:p>
-        </p:txBody>
-      </p:sp>
-      <p:sp>
-        <p:nvSpPr>
-          <p:cNvPr id="8" name="TextBox 7"/>
-          <p:cNvSpPr txBox="1"/>
-          <p:nvPr/>
-        </p:nvSpPr>
-        <p:spPr>
-          <a:xfrm>
-            <a:off x="457200" y="5074920"/>
-            <a:ext cx="11247120" cy="1645920"/>
-          </a:xfrm>
-          <a:prstGeom prst="rect">
-            <a:avLst/>
-          </a:prstGeom>
-          <a:noFill/>
-        </p:spPr>
-        <p:txBody>
-          <a:bodyPr wrap="square">
-            <a:spAutoFit/>
-          </a:bodyPr>
-          <a:lstStyle/>
-          <a:p>
-            <a:pPr algn="l">
-              <a:defRPr sz="1700" b="1">
-                <a:solidFill>
-                  <a:srgbClr val="003366"/>
-                </a:solidFill>
-                <a:latin typeface="Calibri"/>
-              </a:defRPr>
-            </a:pPr>
-            <a:r>
-              <a:t>Key Contributions:</a:t>
-            </a:r>
-          </a:p>
-          <a:p>
-            <a:pPr>
-              <a:spcBef>
-                <a:spcPts val="300"/>
-              </a:spcBef>
-              <a:spcAft>
-                <a:spcPts val="200"/>
-              </a:spcAft>
-              <a:defRPr sz="1400" b="0">
-                <a:solidFill>
-                  <a:srgbClr val="000000"/>
-                </a:solidFill>
-                <a:latin typeface="Calibri"/>
-              </a:defRPr>
-            </a:pPr>
-            <a:r>
-              <a:t>First application of SimCLR to automotive sensor fault detection</a:t>
-            </a:r>
-          </a:p>
-          <a:p>
-            <a:pPr>
-              <a:spcBef>
-                <a:spcPts val="300"/>
-              </a:spcBef>
-              <a:spcAft>
-                <a:spcPts val="200"/>
-              </a:spcAft>
-              <a:defRPr sz="1400" b="0">
-                <a:solidFill>
-                  <a:srgbClr val="000000"/>
-                </a:solidFill>
-                <a:latin typeface="Calibri"/>
-              </a:defRPr>
-            </a:pPr>
-            <a:r>
-              <a:t>Successful cross-domain transfer: real driving data → HIL simulation</a:t>
-            </a:r>
-          </a:p>
-          <a:p>
-            <a:pPr>
-              <a:spcBef>
-                <a:spcPts val="300"/>
-              </a:spcBef>
-              <a:spcAft>
-                <a:spcPts val="200"/>
-              </a:spcAft>
-              <a:defRPr sz="1400" b="0">
-                <a:solidFill>
-                  <a:srgbClr val="000000"/>
-                </a:solidFill>
-                <a:latin typeface="Calibri"/>
-              </a:defRPr>
-            </a:pPr>
-            <a:r>
-              <a:t>Comprehensive multi-threshold evaluation with 6 fault scenarios</a:t>
-            </a:r>
-          </a:p>
-          <a:p>
-            <a:pPr>
-              <a:spcBef>
-                <a:spcPts val="300"/>
-              </a:spcBef>
-              <a:spcAft>
-                <a:spcPts val="200"/>
-              </a:spcAft>
-              <a:defRPr sz="1400" b="0">
-                <a:solidFill>
-                  <a:srgbClr val="000000"/>
-                </a:solidFill>
-                <a:latin typeface="Calibri"/>
-              </a:defRPr>
-            </a:pPr>
-            <a:r>
-              <a:t>Complete pipeline in under 1 minute on CPU (no GPU required)</a:t>
-            </a:r>
-          </a:p>
-        </p:txBody>
-      </p:sp>
-    </p:spTree>
-  </p:cSld>
-  <p:clrMapOvr>
-    <a:masterClrMapping/>
-  </p:clrMapOvr>
-</p:sld>
-</file>
-
 <file path=ppt/slides/slide18.xml><?xml version="1.0" encoding="utf-8"?>
 <p:sld xmlns:a="http://schemas.openxmlformats.org/drawingml/2006/main" xmlns:p="http://schemas.openxmlformats.org/presentationml/2006/main" xmlns:r="http://schemas.openxmlformats.org/officeDocument/2006/relationships">
   <p:cSld>
@@ -11113,21 +11511,243 @@
               </a:defRPr>
             </a:pPr>
             <a:r>
-              <a:t>Future Work</a:t>
+              <a:t>Conclusion</a:t>
             </a:r>
           </a:p>
         </p:txBody>
       </p:sp>
       <p:sp>
         <p:nvSpPr>
-          <p:cNvPr id="5" name="TextBox 4"/>
+          <p:cNvPr id="5" name="Rounded Rectangle 4"/>
+          <p:cNvSpPr/>
+          <p:nvPr/>
+        </p:nvSpPr>
+        <p:spPr>
+          <a:xfrm>
+            <a:off x="365760" y="1371600"/>
+            <a:ext cx="11338560" cy="1051560"/>
+          </a:xfrm>
+          <a:prstGeom prst="roundRect">
+            <a:avLst/>
+          </a:prstGeom>
+          <a:solidFill>
+            <a:srgbClr val="E6F0FF"/>
+          </a:solidFill>
+          <a:ln w="12700">
+            <a:solidFill>
+              <a:srgbClr val="005AA0"/>
+            </a:solidFill>
+          </a:ln>
+        </p:spPr>
+        <p:style>
+          <a:lnRef idx="1">
+            <a:schemeClr val="accent1"/>
+          </a:lnRef>
+          <a:fillRef idx="3">
+            <a:schemeClr val="accent1"/>
+          </a:fillRef>
+          <a:effectRef idx="2">
+            <a:schemeClr val="accent1"/>
+          </a:effectRef>
+          <a:fontRef idx="minor">
+            <a:schemeClr val="lt1"/>
+          </a:fontRef>
+        </p:style>
+        <p:txBody>
+          <a:bodyPr rtlCol="0" anchor="ctr" wrap="square"/>
+          <a:lstStyle/>
+          <a:p>
+            <a:pPr algn="l">
+              <a:defRPr sz="1400" b="0">
+                <a:solidFill>
+                  <a:srgbClr val="000000"/>
+                </a:solidFill>
+                <a:latin typeface="Calibri"/>
+              </a:defRPr>
+            </a:pPr>
+            <a:r>
+              <a:t>RQ1:  Self-supervised representations from healthy A2D2 data successfully detect sensor faults in HIL data.</a:t>
+            </a:r>
+          </a:p>
+          <a:p>
+            <a:pPr algn="l">
+              <a:spcBef>
+                <a:spcPts val="400"/>
+              </a:spcBef>
+              <a:spcAft>
+                <a:spcPts val="200"/>
+              </a:spcAft>
+              <a:defRPr sz="1400" b="1" i="0">
+                <a:solidFill>
+                  <a:srgbClr val="00783C"/>
+                </a:solidFill>
+                <a:latin typeface="Calibri"/>
+              </a:defRPr>
+            </a:pPr>
+            <a:r>
+              <a:t>Cross-domain transfer works without any labeled fault examples. ✓</a:t>
+            </a:r>
+          </a:p>
+        </p:txBody>
+      </p:sp>
+      <p:sp>
+        <p:nvSpPr>
+          <p:cNvPr id="6" name="Rounded Rectangle 5"/>
+          <p:cNvSpPr/>
+          <p:nvPr/>
+        </p:nvSpPr>
+        <p:spPr>
+          <a:xfrm>
+            <a:off x="365760" y="2606040"/>
+            <a:ext cx="11338560" cy="1051560"/>
+          </a:xfrm>
+          <a:prstGeom prst="roundRect">
+            <a:avLst/>
+          </a:prstGeom>
+          <a:solidFill>
+            <a:srgbClr val="E6FFF0"/>
+          </a:solidFill>
+          <a:ln w="12700">
+            <a:solidFill>
+              <a:srgbClr val="00783C"/>
+            </a:solidFill>
+          </a:ln>
+        </p:spPr>
+        <p:style>
+          <a:lnRef idx="1">
+            <a:schemeClr val="accent1"/>
+          </a:lnRef>
+          <a:fillRef idx="3">
+            <a:schemeClr val="accent1"/>
+          </a:fillRef>
+          <a:effectRef idx="2">
+            <a:schemeClr val="accent1"/>
+          </a:effectRef>
+          <a:fontRef idx="minor">
+            <a:schemeClr val="lt1"/>
+          </a:fontRef>
+        </p:style>
+        <p:txBody>
+          <a:bodyPr rtlCol="0" anchor="ctr" wrap="square"/>
+          <a:lstStyle/>
+          <a:p>
+            <a:pPr algn="l">
+              <a:defRPr sz="1400" b="0">
+                <a:solidFill>
+                  <a:srgbClr val="000000"/>
+                </a:solidFill>
+                <a:latin typeface="Calibri"/>
+              </a:defRPr>
+            </a:pPr>
+            <a:r>
+              <a:t>RQ2:  Per-fault precision = 1.0 at all thresholds. Recall: 70.7% → 93.3%.</a:t>
+            </a:r>
+          </a:p>
+          <a:p>
+            <a:pPr algn="l">
+              <a:spcBef>
+                <a:spcPts val="400"/>
+              </a:spcBef>
+              <a:spcAft>
+                <a:spcPts val="200"/>
+              </a:spcAft>
+              <a:defRPr sz="1400" b="1" i="0">
+                <a:solidFill>
+                  <a:srgbClr val="00783C"/>
+                </a:solidFill>
+                <a:latin typeface="Calibri"/>
+              </a:defRPr>
+            </a:pPr>
+            <a:r>
+              <a:t>Optimal: 40th percentile (F1 = 0.965). ✓</a:t>
+            </a:r>
+          </a:p>
+        </p:txBody>
+      </p:sp>
+      <p:sp>
+        <p:nvSpPr>
+          <p:cNvPr id="7" name="Rounded Rectangle 6"/>
+          <p:cNvSpPr/>
+          <p:nvPr/>
+        </p:nvSpPr>
+        <p:spPr>
+          <a:xfrm>
+            <a:off x="365760" y="3840480"/>
+            <a:ext cx="11338560" cy="1051560"/>
+          </a:xfrm>
+          <a:prstGeom prst="roundRect">
+            <a:avLst/>
+          </a:prstGeom>
+          <a:solidFill>
+            <a:srgbClr val="FFF0E6"/>
+          </a:solidFill>
+          <a:ln w="12700">
+            <a:solidFill>
+              <a:srgbClr val="C86400"/>
+            </a:solidFill>
+          </a:ln>
+        </p:spPr>
+        <p:style>
+          <a:lnRef idx="1">
+            <a:schemeClr val="accent1"/>
+          </a:lnRef>
+          <a:fillRef idx="3">
+            <a:schemeClr val="accent1"/>
+          </a:fillRef>
+          <a:effectRef idx="2">
+            <a:schemeClr val="accent1"/>
+          </a:effectRef>
+          <a:fontRef idx="minor">
+            <a:schemeClr val="lt1"/>
+          </a:fontRef>
+        </p:style>
+        <p:txBody>
+          <a:bodyPr rtlCol="0" anchor="ctr" wrap="square"/>
+          <a:lstStyle/>
+          <a:p>
+            <a:pPr algn="l">
+              <a:defRPr sz="1400" b="0">
+                <a:solidFill>
+                  <a:srgbClr val="000000"/>
+                </a:solidFill>
+                <a:latin typeface="Calibri"/>
+              </a:defRPr>
+            </a:pPr>
+            <a:r>
+              <a:t>RQ3:  Speed gain = 99.7% recall (easiest). Acc stuck = 89.8% (hardest).</a:t>
+            </a:r>
+          </a:p>
+          <a:p>
+            <a:pPr algn="l">
+              <a:spcBef>
+                <a:spcPts val="400"/>
+              </a:spcBef>
+              <a:spcAft>
+                <a:spcPts val="200"/>
+              </a:spcAft>
+              <a:defRPr sz="1400" b="1" i="0">
+                <a:solidFill>
+                  <a:srgbClr val="C86400"/>
+                </a:solidFill>
+                <a:latin typeface="Calibri"/>
+              </a:defRPr>
+            </a:pPr>
+            <a:r>
+              <a:t>Detectability correlates with physical severity and sensor variability. ✓</a:t>
+            </a:r>
+          </a:p>
+        </p:txBody>
+      </p:sp>
+      <p:sp>
+        <p:nvSpPr>
+          <p:cNvPr id="8" name="TextBox 7"/>
           <p:cNvSpPr txBox="1"/>
           <p:nvPr/>
         </p:nvSpPr>
         <p:spPr>
           <a:xfrm>
-            <a:off x="457200" y="1417320"/>
-            <a:ext cx="5303520" cy="4572000"/>
+            <a:off x="457200" y="5074920"/>
+            <a:ext cx="11247120" cy="1645920"/>
           </a:xfrm>
           <a:prstGeom prst="rect">
             <a:avLst/>
@@ -11141,7 +11761,7 @@
           <a:lstStyle/>
           <a:p>
             <a:pPr algn="l">
-              <a:defRPr sz="2000" b="1">
+              <a:defRPr sz="1700" b="1">
                 <a:solidFill>
                   <a:srgbClr val="003366"/>
                 </a:solidFill>
@@ -11149,24 +11769,27 @@
               </a:defRPr>
             </a:pPr>
             <a:r>
-              <a:t>Short-term Extensions:</a:t>
-            </a:r>
-          </a:p>
-          <a:p>
-            <a:pPr algn="l">
-              <a:spcBef>
-                <a:spcPts val="400"/>
-              </a:spcBef>
-              <a:spcAft>
-                <a:spcPts val="200"/>
-              </a:spcAft>
-              <a:defRPr sz="600" b="0" i="0">
+              <a:t>Key Contributions:</a:t>
+            </a:r>
+          </a:p>
+          <a:p>
+            <a:pPr>
+              <a:spcBef>
+                <a:spcPts val="300"/>
+              </a:spcBef>
+              <a:spcAft>
+                <a:spcPts val="200"/>
+              </a:spcAft>
+              <a:defRPr sz="1400" b="0">
                 <a:solidFill>
                   <a:srgbClr val="000000"/>
                 </a:solidFill>
                 <a:latin typeface="Calibri"/>
               </a:defRPr>
             </a:pPr>
+            <a:r>
+              <a:t>First application of SimCLR to automotive sensor fault detection</a:t>
+            </a:r>
           </a:p>
           <a:p>
             <a:pPr>
@@ -11176,7 +11799,7 @@
               <a:spcAft>
                 <a:spcPts val="200"/>
               </a:spcAft>
-              <a:defRPr sz="1600" b="0">
+              <a:defRPr sz="1400" b="0">
                 <a:solidFill>
                   <a:srgbClr val="000000"/>
                 </a:solidFill>
@@ -11184,26 +11807,7 @@
               </a:defRPr>
             </a:pPr>
             <a:r>
-              <a:t>Add more sensor channels</a:t>
-            </a:r>
-          </a:p>
-          <a:p>
-            <a:pPr algn="l">
-              <a:spcBef>
-                <a:spcPts val="400"/>
-              </a:spcBef>
-              <a:spcAft>
-                <a:spcPts val="200"/>
-              </a:spcAft>
-              <a:defRPr sz="1300" b="0" i="0">
-                <a:solidFill>
-                  <a:srgbClr val="505050"/>
-                </a:solidFill>
-                <a:latin typeface="Calibri"/>
-              </a:defRPr>
-            </a:pPr>
-            <a:r>
-              <a:t>  (RPM, steering, brake pressure)</a:t>
+              <a:t>Successful cross-domain transfer: real driving data → HIL simulation</a:t>
             </a:r>
           </a:p>
           <a:p>
@@ -11214,7 +11818,7 @@
               <a:spcAft>
                 <a:spcPts val="200"/>
               </a:spcAft>
-              <a:defRPr sz="1600" b="0">
+              <a:defRPr sz="1400" b="0">
                 <a:solidFill>
                   <a:srgbClr val="000000"/>
                 </a:solidFill>
@@ -11222,26 +11826,7 @@
               </a:defRPr>
             </a:pPr>
             <a:r>
-              <a:t>Fault localization</a:t>
-            </a:r>
-          </a:p>
-          <a:p>
-            <a:pPr algn="l">
-              <a:spcBef>
-                <a:spcPts val="400"/>
-              </a:spcBef>
-              <a:spcAft>
-                <a:spcPts val="200"/>
-              </a:spcAft>
-              <a:defRPr sz="1300" b="0" i="0">
-                <a:solidFill>
-                  <a:srgbClr val="505050"/>
-                </a:solidFill>
-                <a:latin typeface="Calibri"/>
-              </a:defRPr>
-            </a:pPr>
-            <a:r>
-              <a:t>  Identify which sensor is faulty</a:t>
+              <a:t>Comprehensive multi-threshold evaluation with 6 fault scenarios</a:t>
             </a:r>
           </a:p>
           <a:p>
@@ -11252,7 +11837,7 @@
               <a:spcAft>
                 <a:spcPts val="200"/>
               </a:spcAft>
-              <a:defRPr sz="1600" b="0">
+              <a:defRPr sz="1400" b="0">
                 <a:solidFill>
                   <a:srgbClr val="000000"/>
                 </a:solidFill>
@@ -11260,249 +11845,7 @@
               </a:defRPr>
             </a:pPr>
             <a:r>
-              <a:t>Adaptive thresholding</a:t>
-            </a:r>
-          </a:p>
-          <a:p>
-            <a:pPr algn="l">
-              <a:spcBef>
-                <a:spcPts val="400"/>
-              </a:spcBef>
-              <a:spcAft>
-                <a:spcPts val="200"/>
-              </a:spcAft>
-              <a:defRPr sz="1300" b="0" i="0">
-                <a:solidFill>
-                  <a:srgbClr val="505050"/>
-                </a:solidFill>
-                <a:latin typeface="Calibri"/>
-              </a:defRPr>
-            </a:pPr>
-            <a:r>
-              <a:t>  Eliminate manual threshold selection</a:t>
-            </a:r>
-          </a:p>
-          <a:p>
-            <a:pPr>
-              <a:spcBef>
-                <a:spcPts val="300"/>
-              </a:spcBef>
-              <a:spcAft>
-                <a:spcPts val="200"/>
-              </a:spcAft>
-              <a:defRPr sz="1600" b="0">
-                <a:solidFill>
-                  <a:srgbClr val="000000"/>
-                </a:solidFill>
-                <a:latin typeface="Calibri"/>
-              </a:defRPr>
-            </a:pPr>
-            <a:r>
-              <a:t>Test with real vehicle fault data</a:t>
-            </a:r>
-          </a:p>
-        </p:txBody>
-      </p:sp>
-      <p:sp>
-        <p:nvSpPr>
-          <p:cNvPr id="6" name="TextBox 5"/>
-          <p:cNvSpPr txBox="1"/>
-          <p:nvPr/>
-        </p:nvSpPr>
-        <p:spPr>
-          <a:xfrm>
-            <a:off x="6217920" y="1417320"/>
-            <a:ext cx="5303520" cy="4572000"/>
-          </a:xfrm>
-          <a:prstGeom prst="rect">
-            <a:avLst/>
-          </a:prstGeom>
-          <a:noFill/>
-        </p:spPr>
-        <p:txBody>
-          <a:bodyPr wrap="square">
-            <a:spAutoFit/>
-          </a:bodyPr>
-          <a:lstStyle/>
-          <a:p>
-            <a:pPr algn="l">
-              <a:defRPr sz="2000" b="1">
-                <a:solidFill>
-                  <a:srgbClr val="003366"/>
-                </a:solidFill>
-                <a:latin typeface="Calibri"/>
-              </a:defRPr>
-            </a:pPr>
-            <a:r>
-              <a:t>Long-term Research:</a:t>
-            </a:r>
-          </a:p>
-          <a:p>
-            <a:pPr algn="l">
-              <a:spcBef>
-                <a:spcPts val="400"/>
-              </a:spcBef>
-              <a:spcAft>
-                <a:spcPts val="200"/>
-              </a:spcAft>
-              <a:defRPr sz="600" b="0" i="0">
-                <a:solidFill>
-                  <a:srgbClr val="000000"/>
-                </a:solidFill>
-                <a:latin typeface="Calibri"/>
-              </a:defRPr>
-            </a:pPr>
-          </a:p>
-          <a:p>
-            <a:pPr>
-              <a:spcBef>
-                <a:spcPts val="300"/>
-              </a:spcBef>
-              <a:spcAft>
-                <a:spcPts val="200"/>
-              </a:spcAft>
-              <a:defRPr sz="1600" b="0">
-                <a:solidFill>
-                  <a:srgbClr val="000000"/>
-                </a:solidFill>
-                <a:latin typeface="Calibri"/>
-              </a:defRPr>
-            </a:pPr>
-            <a:r>
-              <a:t>Compare SSL methods</a:t>
-            </a:r>
-          </a:p>
-          <a:p>
-            <a:pPr algn="l">
-              <a:spcBef>
-                <a:spcPts val="400"/>
-              </a:spcBef>
-              <a:spcAft>
-                <a:spcPts val="200"/>
-              </a:spcAft>
-              <a:defRPr sz="1300" b="0" i="0">
-                <a:solidFill>
-                  <a:srgbClr val="505050"/>
-                </a:solidFill>
-                <a:latin typeface="Calibri"/>
-              </a:defRPr>
-            </a:pPr>
-            <a:r>
-              <a:t>  TS2Vec, MoCo, BYOL benchmarking</a:t>
-            </a:r>
-          </a:p>
-          <a:p>
-            <a:pPr>
-              <a:spcBef>
-                <a:spcPts val="300"/>
-              </a:spcBef>
-              <a:spcAft>
-                <a:spcPts val="200"/>
-              </a:spcAft>
-              <a:defRPr sz="1600" b="0">
-                <a:solidFill>
-                  <a:srgbClr val="000000"/>
-                </a:solidFill>
-                <a:latin typeface="Calibri"/>
-              </a:defRPr>
-            </a:pPr>
-            <a:r>
-              <a:t>Explainability (XAI)</a:t>
-            </a:r>
-          </a:p>
-          <a:p>
-            <a:pPr algn="l">
-              <a:spcBef>
-                <a:spcPts val="400"/>
-              </a:spcBef>
-              <a:spcAft>
-                <a:spcPts val="200"/>
-              </a:spcAft>
-              <a:defRPr sz="1300" b="0" i="0">
-                <a:solidFill>
-                  <a:srgbClr val="505050"/>
-                </a:solidFill>
-                <a:latin typeface="Calibri"/>
-              </a:defRPr>
-            </a:pPr>
-            <a:r>
-              <a:t>  Diagnostic insights for faults</a:t>
-            </a:r>
-          </a:p>
-          <a:p>
-            <a:pPr>
-              <a:spcBef>
-                <a:spcPts val="300"/>
-              </a:spcBef>
-              <a:spcAft>
-                <a:spcPts val="200"/>
-              </a:spcAft>
-              <a:defRPr sz="1600" b="0">
-                <a:solidFill>
-                  <a:srgbClr val="000000"/>
-                </a:solidFill>
-                <a:latin typeface="Calibri"/>
-              </a:defRPr>
-            </a:pPr>
-            <a:r>
-              <a:t>Edge deployment</a:t>
-            </a:r>
-          </a:p>
-          <a:p>
-            <a:pPr algn="l">
-              <a:spcBef>
-                <a:spcPts val="400"/>
-              </a:spcBef>
-              <a:spcAft>
-                <a:spcPts val="200"/>
-              </a:spcAft>
-              <a:defRPr sz="1300" b="0" i="0">
-                <a:solidFill>
-                  <a:srgbClr val="505050"/>
-                </a:solidFill>
-                <a:latin typeface="Calibri"/>
-              </a:defRPr>
-            </a:pPr>
-            <a:r>
-              <a:t>  Real-time in-vehicle detection</a:t>
-            </a:r>
-          </a:p>
-          <a:p>
-            <a:pPr>
-              <a:spcBef>
-                <a:spcPts val="300"/>
-              </a:spcBef>
-              <a:spcAft>
-                <a:spcPts val="200"/>
-              </a:spcAft>
-              <a:defRPr sz="1600" b="0">
-                <a:solidFill>
-                  <a:srgbClr val="000000"/>
-                </a:solidFill>
-                <a:latin typeface="Calibri"/>
-              </a:defRPr>
-            </a:pPr>
-            <a:r>
-              <a:t>ISO 26262 ASIL integration</a:t>
-            </a:r>
-          </a:p>
-          <a:p>
-            <a:pPr algn="l">
-              <a:spcBef>
-                <a:spcPts val="400"/>
-              </a:spcBef>
-              <a:spcAft>
-                <a:spcPts val="200"/>
-              </a:spcAft>
-              <a:defRPr sz="1300" b="0" i="0">
-                <a:solidFill>
-                  <a:srgbClr val="505050"/>
-                </a:solidFill>
-                <a:latin typeface="Calibri"/>
-              </a:defRPr>
-            </a:pPr>
-            <a:r>
-              <a:t>  Safety integrity level mapping</a:t>
+              <a:t>Complete pipeline in under 1 minute on CPU (no GPU required)</a:t>
             </a:r>
           </a:p>
         </p:txBody>
@@ -11532,7 +11875,7 @@
             <a:spLocks noGrp="1"/>
           </p:cNvSpPr>
           <p:nvPr>
-            <p:ph type="ctrTitle"/>
+            <p:ph type="title"/>
           </p:nvPr>
         </p:nvSpPr>
         <p:spPr/>
@@ -11544,12 +11887,12 @@
       </p:sp>
       <p:sp>
         <p:nvSpPr>
-          <p:cNvPr id="3" name="Subtitle 2"/>
+          <p:cNvPr id="3" name="Text Placeholder 2"/>
           <p:cNvSpPr>
             <a:spLocks noGrp="1"/>
           </p:cNvSpPr>
           <p:nvPr>
-            <p:ph type="subTitle" idx="1"/>
+            <p:ph type="body" idx="1"/>
           </p:nvPr>
         </p:nvSpPr>
         <p:spPr/>
@@ -11567,8 +11910,8 @@
         </p:nvSpPr>
         <p:spPr>
           <a:xfrm>
-            <a:off x="914400" y="1371600"/>
-            <a:ext cx="10058400" cy="4572000"/>
+            <a:off x="457200" y="777240"/>
+            <a:ext cx="11247120" cy="502920"/>
           </a:xfrm>
           <a:prstGeom prst="rect">
             <a:avLst/>
@@ -11581,8 +11924,8 @@
           </a:bodyPr>
           <a:lstStyle/>
           <a:p>
-            <a:pPr algn="ctr">
-              <a:defRPr sz="4400" b="1">
+            <a:pPr algn="l">
+              <a:defRPr sz="2600" b="1">
                 <a:solidFill>
                   <a:srgbClr val="003366"/>
                 </a:solidFill>
@@ -11590,18 +11933,54 @@
               </a:defRPr>
             </a:pPr>
             <a:r>
-              <a:t>Thank You</a:t>
-            </a:r>
-          </a:p>
+              <a:t>Future Work</a:t>
+            </a:r>
+          </a:p>
+        </p:txBody>
+      </p:sp>
+      <p:sp>
+        <p:nvSpPr>
+          <p:cNvPr id="5" name="TextBox 4"/>
+          <p:cNvSpPr txBox="1"/>
+          <p:nvPr/>
+        </p:nvSpPr>
+        <p:spPr>
+          <a:xfrm>
+            <a:off x="457200" y="1417320"/>
+            <a:ext cx="5303520" cy="4572000"/>
+          </a:xfrm>
+          <a:prstGeom prst="rect">
+            <a:avLst/>
+          </a:prstGeom>
+          <a:noFill/>
+        </p:spPr>
+        <p:txBody>
+          <a:bodyPr wrap="square">
+            <a:spAutoFit/>
+          </a:bodyPr>
+          <a:lstStyle/>
           <a:p>
             <a:pPr algn="l">
+              <a:defRPr sz="2000" b="1">
+                <a:solidFill>
+                  <a:srgbClr val="003366"/>
+                </a:solidFill>
+                <a:latin typeface="Calibri"/>
+              </a:defRPr>
+            </a:pPr>
+            <a:r>
+              <a:t>Short-term Extensions:</a:t>
+            </a:r>
+          </a:p>
+          <a:p>
+            <a:pPr algn="l">
               <a:spcBef>
                 <a:spcPts val="400"/>
               </a:spcBef>
               <a:spcAft>
                 <a:spcPts val="200"/>
               </a:spcAft>
-              <a:defRPr sz="1600" b="0" i="0">
+              <a:defRPr sz="600" b="0" i="0">
                 <a:solidFill>
                   <a:srgbClr val="000000"/>
                 </a:solidFill>
@@ -11610,22 +11989,60 @@
             </a:pPr>
           </a:p>
           <a:p>
-            <a:pPr algn="ctr">
+            <a:pPr>
+              <a:spcBef>
+                <a:spcPts val="300"/>
+              </a:spcBef>
+              <a:spcAft>
+                <a:spcPts val="200"/>
+              </a:spcAft>
+              <a:defRPr sz="1600" b="0">
+                <a:solidFill>
+                  <a:srgbClr val="000000"/>
+                </a:solidFill>
+                <a:latin typeface="Calibri"/>
+              </a:defRPr>
+            </a:pPr>
+            <a:r>
+              <a:t>Add more sensor channels</a:t>
+            </a:r>
+          </a:p>
+          <a:p>
+            <a:pPr algn="l">
               <a:spcBef>
                 <a:spcPts val="400"/>
               </a:spcBef>
               <a:spcAft>
                 <a:spcPts val="200"/>
               </a:spcAft>
-              <a:defRPr sz="3200" b="0" i="0">
-                <a:solidFill>
-                  <a:srgbClr val="005AA0"/>
-                </a:solidFill>
-                <a:latin typeface="Calibri"/>
-              </a:defRPr>
-            </a:pPr>
-            <a:r>
-              <a:t>Questions?</a:t>
+              <a:defRPr sz="1300" b="0" i="0">
+                <a:solidFill>
+                  <a:srgbClr val="505050"/>
+                </a:solidFill>
+                <a:latin typeface="Calibri"/>
+              </a:defRPr>
+            </a:pPr>
+            <a:r>
+              <a:t>  (RPM, steering, brake pressure)</a:t>
+            </a:r>
+          </a:p>
+          <a:p>
+            <a:pPr>
+              <a:spcBef>
+                <a:spcPts val="300"/>
+              </a:spcBef>
+              <a:spcAft>
+                <a:spcPts val="200"/>
+              </a:spcAft>
+              <a:defRPr sz="1600" b="0">
+                <a:solidFill>
+                  <a:srgbClr val="000000"/>
+                </a:solidFill>
+                <a:latin typeface="Calibri"/>
+              </a:defRPr>
+            </a:pPr>
+            <a:r>
+              <a:t>Fault localization</a:t>
             </a:r>
           </a:p>
           <a:p>
@@ -11636,23 +12053,64 @@
               <a:spcAft>
                 <a:spcPts val="200"/>
               </a:spcAft>
-              <a:defRPr sz="2000" b="0" i="0">
+              <a:defRPr sz="1300" b="0" i="0">
+                <a:solidFill>
+                  <a:srgbClr val="505050"/>
+                </a:solidFill>
+                <a:latin typeface="Calibri"/>
+              </a:defRPr>
+            </a:pPr>
+            <a:r>
+              <a:t>  Identify which sensor is faulty</a:t>
+            </a:r>
+          </a:p>
+          <a:p>
+            <a:pPr>
+              <a:spcBef>
+                <a:spcPts val="300"/>
+              </a:spcBef>
+              <a:spcAft>
+                <a:spcPts val="200"/>
+              </a:spcAft>
+              <a:defRPr sz="1600" b="0">
                 <a:solidFill>
                   <a:srgbClr val="000000"/>
                 </a:solidFill>
                 <a:latin typeface="Calibri"/>
               </a:defRPr>
             </a:pPr>
-          </a:p>
-          <a:p>
-            <a:pPr algn="ctr">
+            <a:r>
+              <a:t>Adaptive thresholding</a:t>
+            </a:r>
+          </a:p>
+          <a:p>
+            <a:pPr algn="l">
               <a:spcBef>
                 <a:spcPts val="400"/>
               </a:spcBef>
               <a:spcAft>
                 <a:spcPts val="200"/>
               </a:spcAft>
-              <a:defRPr sz="2000" b="0" i="0">
+              <a:defRPr sz="1300" b="0" i="0">
+                <a:solidFill>
+                  <a:srgbClr val="505050"/>
+                </a:solidFill>
+                <a:latin typeface="Calibri"/>
+              </a:defRPr>
+            </a:pPr>
+            <a:r>
+              <a:t>  Eliminate manual threshold selection</a:t>
+            </a:r>
+          </a:p>
+          <a:p>
+            <a:pPr>
+              <a:spcBef>
+                <a:spcPts val="300"/>
+              </a:spcBef>
+              <a:spcAft>
+                <a:spcPts val="200"/>
+              </a:spcAft>
+              <a:defRPr sz="1600" b="0">
                 <a:solidFill>
                   <a:srgbClr val="000000"/>
                 </a:solidFill>
@@ -11660,18 +12118,89 @@
               </a:defRPr>
             </a:pPr>
             <a:r>
-              <a:t>Yahia Amir Yahia Gamal</a:t>
-            </a:r>
-          </a:p>
-          <a:p>
-            <a:pPr algn="ctr">
+              <a:t>Test with real vehicle fault data</a:t>
+            </a:r>
+          </a:p>
+        </p:txBody>
+      </p:sp>
+      <p:sp>
+        <p:nvSpPr>
+          <p:cNvPr id="6" name="TextBox 5"/>
+          <p:cNvSpPr txBox="1"/>
+          <p:nvPr/>
+        </p:nvSpPr>
+        <p:spPr>
+          <a:xfrm>
+            <a:off x="6217920" y="1417320"/>
+            <a:ext cx="5303520" cy="4572000"/>
+          </a:xfrm>
+          <a:prstGeom prst="rect">
+            <a:avLst/>
+          </a:prstGeom>
+          <a:noFill/>
+        </p:spPr>
+        <p:txBody>
+          <a:bodyPr wrap="square">
+            <a:spAutoFit/>
+          </a:bodyPr>
+          <a:lstStyle/>
+          <a:p>
+            <a:pPr algn="l">
+              <a:defRPr sz="2000" b="1">
+                <a:solidFill>
+                  <a:srgbClr val="003366"/>
+                </a:solidFill>
+                <a:latin typeface="Calibri"/>
+              </a:defRPr>
+            </a:pPr>
+            <a:r>
+              <a:t>Long-term Research:</a:t>
+            </a:r>
+          </a:p>
+          <a:p>
+            <a:pPr algn="l">
               <a:spcBef>
                 <a:spcPts val="400"/>
               </a:spcBef>
               <a:spcAft>
                 <a:spcPts val="200"/>
               </a:spcAft>
-              <a:defRPr sz="1600" b="0" i="0">
+              <a:defRPr sz="600" b="0" i="0">
+                <a:solidFill>
+                  <a:srgbClr val="000000"/>
+                </a:solidFill>
+                <a:latin typeface="Calibri"/>
+              </a:defRPr>
+            </a:pPr>
+          </a:p>
+          <a:p>
+            <a:pPr>
+              <a:spcBef>
+                <a:spcPts val="300"/>
+              </a:spcBef>
+              <a:spcAft>
+                <a:spcPts val="200"/>
+              </a:spcAft>
+              <a:defRPr sz="1600" b="0">
+                <a:solidFill>
+                  <a:srgbClr val="000000"/>
+                </a:solidFill>
+                <a:latin typeface="Calibri"/>
+              </a:defRPr>
+            </a:pPr>
+            <a:r>
+              <a:t>Compare SSL methods</a:t>
+            </a:r>
+          </a:p>
+          <a:p>
+            <a:pPr algn="l">
+              <a:spcBef>
+                <a:spcPts val="400"/>
+              </a:spcBef>
+              <a:spcAft>
+                <a:spcPts val="200"/>
+              </a:spcAft>
+              <a:defRPr sz="1300" b="0" i="0">
                 <a:solidFill>
                   <a:srgbClr val="505050"/>
                 </a:solidFill>
@@ -11679,18 +12208,37 @@
               </a:defRPr>
             </a:pPr>
             <a:r>
-              <a:t>Institute of Software and Systems Engineering</a:t>
-            </a:r>
-          </a:p>
-          <a:p>
-            <a:pPr algn="ctr">
+              <a:t>  TS2Vec, MoCo, BYOL benchmarking</a:t>
+            </a:r>
+          </a:p>
+          <a:p>
+            <a:pPr>
+              <a:spcBef>
+                <a:spcPts val="300"/>
+              </a:spcBef>
+              <a:spcAft>
+                <a:spcPts val="200"/>
+              </a:spcAft>
+              <a:defRPr sz="1600" b="0">
+                <a:solidFill>
+                  <a:srgbClr val="000000"/>
+                </a:solidFill>
+                <a:latin typeface="Calibri"/>
+              </a:defRPr>
+            </a:pPr>
+            <a:r>
+              <a:t>Explainability (XAI)</a:t>
+            </a:r>
+          </a:p>
+          <a:p>
+            <a:pPr algn="l">
               <a:spcBef>
                 <a:spcPts val="400"/>
               </a:spcBef>
               <a:spcAft>
                 <a:spcPts val="200"/>
               </a:spcAft>
-              <a:defRPr sz="1600" b="0" i="0">
+              <a:defRPr sz="1300" b="0" i="0">
                 <a:solidFill>
                   <a:srgbClr val="505050"/>
                 </a:solidFill>
@@ -11698,7 +12246,83 @@
               </a:defRPr>
             </a:pPr>
             <a:r>
-              <a:t>TU Clausthal  |  2025</a:t>
+              <a:t>  Diagnostic insights for faults</a:t>
+            </a:r>
+          </a:p>
+          <a:p>
+            <a:pPr>
+              <a:spcBef>
+                <a:spcPts val="300"/>
+              </a:spcBef>
+              <a:spcAft>
+                <a:spcPts val="200"/>
+              </a:spcAft>
+              <a:defRPr sz="1600" b="0">
+                <a:solidFill>
+                  <a:srgbClr val="000000"/>
+                </a:solidFill>
+                <a:latin typeface="Calibri"/>
+              </a:defRPr>
+            </a:pPr>
+            <a:r>
+              <a:t>Edge deployment</a:t>
+            </a:r>
+          </a:p>
+          <a:p>
+            <a:pPr algn="l">
+              <a:spcBef>
+                <a:spcPts val="400"/>
+              </a:spcBef>
+              <a:spcAft>
+                <a:spcPts val="200"/>
+              </a:spcAft>
+              <a:defRPr sz="1300" b="0" i="0">
+                <a:solidFill>
+                  <a:srgbClr val="505050"/>
+                </a:solidFill>
+                <a:latin typeface="Calibri"/>
+              </a:defRPr>
+            </a:pPr>
+            <a:r>
+              <a:t>  Real-time in-vehicle detection</a:t>
+            </a:r>
+          </a:p>
+          <a:p>
+            <a:pPr>
+              <a:spcBef>
+                <a:spcPts val="300"/>
+              </a:spcBef>
+              <a:spcAft>
+                <a:spcPts val="200"/>
+              </a:spcAft>
+              <a:defRPr sz="1600" b="0">
+                <a:solidFill>
+                  <a:srgbClr val="000000"/>
+                </a:solidFill>
+                <a:latin typeface="Calibri"/>
+              </a:defRPr>
+            </a:pPr>
+            <a:r>
+              <a:t>ISO 26262 ASIL integration</a:t>
+            </a:r>
+          </a:p>
+          <a:p>
+            <a:pPr algn="l">
+              <a:spcBef>
+                <a:spcPts val="400"/>
+              </a:spcBef>
+              <a:spcAft>
+                <a:spcPts val="200"/>
+              </a:spcAft>
+              <a:defRPr sz="1300" b="0" i="0">
+                <a:solidFill>
+                  <a:srgbClr val="505050"/>
+                </a:solidFill>
+                <a:latin typeface="Calibri"/>
+              </a:defRPr>
+            </a:pPr>
+            <a:r>
+              <a:t>  Safety integrity level mapping</a:t>
             </a:r>
           </a:p>
         </p:txBody>
@@ -12010,6 +12634,202 @@
             </a:pPr>
             <a:r>
               <a:t>10.   Conclusion and Future Work</a:t>
+            </a:r>
+          </a:p>
+        </p:txBody>
+      </p:sp>
+    </p:spTree>
+  </p:cSld>
+  <p:clrMapOvr>
+    <a:masterClrMapping/>
+  </p:clrMapOvr>
+</p:sld>
+</file>
+
+<file path=ppt/slides/slide20.xml><?xml version="1.0" encoding="utf-8"?>
+<p:sld xmlns:a="http://schemas.openxmlformats.org/drawingml/2006/main" xmlns:p="http://schemas.openxmlformats.org/presentationml/2006/main" xmlns:r="http://schemas.openxmlformats.org/officeDocument/2006/relationships">
+  <p:cSld>
+    <p:spTree>
+      <p:nvGrpSpPr>
+        <p:cNvPr id="1" name=""/>
+        <p:cNvGrpSpPr/>
+        <p:nvPr/>
+      </p:nvGrpSpPr>
+      <p:grpSpPr/>
+      <p:sp>
+        <p:nvSpPr>
+          <p:cNvPr id="2" name="Title 1"/>
+          <p:cNvSpPr>
+            <a:spLocks noGrp="1"/>
+          </p:cNvSpPr>
+          <p:nvPr>
+            <p:ph type="ctrTitle"/>
+          </p:nvPr>
+        </p:nvSpPr>
+        <p:spPr/>
+        <p:txBody>
+          <a:bodyPr/>
+          <a:lstStyle/>
+          <a:p/>
+        </p:txBody>
+      </p:sp>
+      <p:sp>
+        <p:nvSpPr>
+          <p:cNvPr id="3" name="Subtitle 2"/>
+          <p:cNvSpPr>
+            <a:spLocks noGrp="1"/>
+          </p:cNvSpPr>
+          <p:nvPr>
+            <p:ph type="subTitle" idx="1"/>
+          </p:nvPr>
+        </p:nvSpPr>
+        <p:spPr/>
+        <p:txBody>
+          <a:bodyPr/>
+          <a:lstStyle/>
+          <a:p/>
+        </p:txBody>
+      </p:sp>
+      <p:sp>
+        <p:nvSpPr>
+          <p:cNvPr id="4" name="TextBox 3"/>
+          <p:cNvSpPr txBox="1"/>
+          <p:nvPr/>
+        </p:nvSpPr>
+        <p:spPr>
+          <a:xfrm>
+            <a:off x="914400" y="1371600"/>
+            <a:ext cx="10058400" cy="4572000"/>
+          </a:xfrm>
+          <a:prstGeom prst="rect">
+            <a:avLst/>
+          </a:prstGeom>
+          <a:noFill/>
+        </p:spPr>
+        <p:txBody>
+          <a:bodyPr wrap="square">
+            <a:spAutoFit/>
+          </a:bodyPr>
+          <a:lstStyle/>
+          <a:p>
+            <a:pPr algn="ctr">
+              <a:defRPr sz="4400" b="1">
+                <a:solidFill>
+                  <a:srgbClr val="003366"/>
+                </a:solidFill>
+                <a:latin typeface="Calibri"/>
+              </a:defRPr>
+            </a:pPr>
+            <a:r>
+              <a:t>Thank You</a:t>
+            </a:r>
+          </a:p>
+          <a:p>
+            <a:pPr algn="l">
+              <a:spcBef>
+                <a:spcPts val="400"/>
+              </a:spcBef>
+              <a:spcAft>
+                <a:spcPts val="200"/>
+              </a:spcAft>
+              <a:defRPr sz="1600" b="0" i="0">
+                <a:solidFill>
+                  <a:srgbClr val="000000"/>
+                </a:solidFill>
+                <a:latin typeface="Calibri"/>
+              </a:defRPr>
+            </a:pPr>
+          </a:p>
+          <a:p>
+            <a:pPr algn="ctr">
+              <a:spcBef>
+                <a:spcPts val="400"/>
+              </a:spcBef>
+              <a:spcAft>
+                <a:spcPts val="200"/>
+              </a:spcAft>
+              <a:defRPr sz="3200" b="0" i="0">
+                <a:solidFill>
+                  <a:srgbClr val="005AA0"/>
+                </a:solidFill>
+                <a:latin typeface="Calibri"/>
+              </a:defRPr>
+            </a:pPr>
+            <a:r>
+              <a:t>Questions?</a:t>
+            </a:r>
+          </a:p>
+          <a:p>
+            <a:pPr algn="l">
+              <a:spcBef>
+                <a:spcPts val="400"/>
+              </a:spcBef>
+              <a:spcAft>
+                <a:spcPts val="200"/>
+              </a:spcAft>
+              <a:defRPr sz="2000" b="0" i="0">
+                <a:solidFill>
+                  <a:srgbClr val="000000"/>
+                </a:solidFill>
+                <a:latin typeface="Calibri"/>
+              </a:defRPr>
+            </a:pPr>
+          </a:p>
+          <a:p>
+            <a:pPr algn="ctr">
+              <a:spcBef>
+                <a:spcPts val="400"/>
+              </a:spcBef>
+              <a:spcAft>
+                <a:spcPts val="200"/>
+              </a:spcAft>
+              <a:defRPr sz="2000" b="0" i="0">
+                <a:solidFill>
+                  <a:srgbClr val="000000"/>
+                </a:solidFill>
+                <a:latin typeface="Calibri"/>
+              </a:defRPr>
+            </a:pPr>
+            <a:r>
+              <a:t>Yahia Amir Yahia Gamal</a:t>
+            </a:r>
+          </a:p>
+          <a:p>
+            <a:pPr algn="ctr">
+              <a:spcBef>
+                <a:spcPts val="400"/>
+              </a:spcBef>
+              <a:spcAft>
+                <a:spcPts val="200"/>
+              </a:spcAft>
+              <a:defRPr sz="1600" b="0" i="0">
+                <a:solidFill>
+                  <a:srgbClr val="505050"/>
+                </a:solidFill>
+                <a:latin typeface="Calibri"/>
+              </a:defRPr>
+            </a:pPr>
+            <a:r>
+              <a:t>Institute of Software and Systems Engineering</a:t>
+            </a:r>
+          </a:p>
+          <a:p>
+            <a:pPr algn="ctr">
+              <a:spcBef>
+                <a:spcPts val="400"/>
+              </a:spcBef>
+              <a:spcAft>
+                <a:spcPts val="200"/>
+              </a:spcAft>
+              <a:defRPr sz="1600" b="0" i="0">
+                <a:solidFill>
+                  <a:srgbClr val="505050"/>
+                </a:solidFill>
+                <a:latin typeface="Calibri"/>
+              </a:defRPr>
+            </a:pPr>
+            <a:r>
+              <a:t>TU Clausthal  |  2025</a:t>
             </a:r>
           </a:p>
         </p:txBody>

</xml_diff>